<commit_message>
Update server.js and reorganize templates
</commit_message>
<xml_diff>
--- a/templates/Template_2_moderno.pptx
+++ b/templates/Template_2_moderno.pptx
@@ -11,28 +11,16 @@
   <p:notesSz cx="6858000" cy="9144000"/>
   <p:embeddedFontLst>
     <p:embeddedFont>
-      <p:font typeface="Poppins" charset="1" panose="00000500000000000000"/>
+      <p:font typeface="Montserrat" charset="1" panose="00000500000000000000"/>
       <p:regular r:id="rId7"/>
     </p:embeddedFont>
     <p:embeddedFont>
-      <p:font typeface="Playfair Display SC" charset="1" panose="00000500000000000000"/>
+      <p:font typeface="Montserrat Bold" charset="1" panose="00000800000000000000"/>
       <p:regular r:id="rId8"/>
     </p:embeddedFont>
     <p:embeddedFont>
-      <p:font typeface="Calibri (MS)" charset="1" panose="020F0502020204030204"/>
+      <p:font typeface="Montserrat Italics" charset="1" panose="00000500000000000000"/>
       <p:regular r:id="rId9"/>
-    </p:embeddedFont>
-    <p:embeddedFont>
-      <p:font typeface="Poppins Italics" charset="1" panose="00000500000000000000"/>
-      <p:regular r:id="rId10"/>
-    </p:embeddedFont>
-    <p:embeddedFont>
-      <p:font typeface="Poppins Bold" charset="1" panose="00000800000000000000"/>
-      <p:regular r:id="rId11"/>
-    </p:embeddedFont>
-    <p:embeddedFont>
-      <p:font typeface="Playfair Display" charset="1" panose="00000000000000000000"/>
-      <p:regular r:id="rId12"/>
     </p:embeddedFont>
   </p:embeddedFontLst>
   <p:defaultTextStyle>
@@ -3093,8 +3081,8 @@
         </p:nvSpPr>
         <p:spPr>
           <a:xfrm flipH="false" flipV="false" rot="0">
-            <a:off x="-1789099" y="-799490"/>
-            <a:ext cx="11657388" cy="31715398"/>
+            <a:off x="14115384" y="-205435"/>
+            <a:ext cx="7171184" cy="30481435"/>
           </a:xfrm>
           <a:custGeom>
             <a:avLst/>
@@ -3103,18 +3091,18 @@
             <a:cxnLst/>
             <a:rect r="r" b="b" t="t" l="l"/>
             <a:pathLst>
-              <a:path h="31715398" w="11657388">
+              <a:path h="30481435" w="7171184">
                 <a:moveTo>
                   <a:pt x="0" y="0"/>
                 </a:moveTo>
                 <a:lnTo>
-                  <a:pt x="11657388" y="0"/>
+                  <a:pt x="7171185" y="0"/>
                 </a:lnTo>
                 <a:lnTo>
-                  <a:pt x="11657388" y="31715398"/>
+                  <a:pt x="7171185" y="30481435"/>
                 </a:lnTo>
                 <a:lnTo>
-                  <a:pt x="0" y="31715398"/>
+                  <a:pt x="0" y="30481435"/>
                 </a:lnTo>
                 <a:lnTo>
                   <a:pt x="0" y="0"/>
@@ -3137,16 +3125,196 @@
           </a:blipFill>
         </p:spPr>
       </p:sp>
-      <p:sp>
-        <p:nvSpPr>
-          <p:cNvPr name="Freeform 3" id="3"/>
+      <p:grpSp>
+        <p:nvGrpSpPr>
+          <p:cNvPr name="Group 3" id="3"/>
+          <p:cNvGrpSpPr/>
+          <p:nvPr/>
+        </p:nvGrpSpPr>
+        <p:grpSpPr>
+          <a:xfrm rot="0">
+            <a:off x="1378125" y="4742278"/>
+            <a:ext cx="11667734" cy="26956"/>
+            <a:chOff x="0" y="0"/>
+            <a:chExt cx="15556979" cy="35941"/>
+          </a:xfrm>
+        </p:grpSpPr>
+        <p:sp>
+          <p:nvSpPr>
+            <p:cNvPr name="Freeform 4" id="4"/>
+            <p:cNvSpPr/>
+            <p:nvPr/>
+          </p:nvSpPr>
+          <p:spPr>
+            <a:xfrm flipH="false" flipV="false" rot="0">
+              <a:off x="17907" y="0"/>
+              <a:ext cx="15521051" cy="35941"/>
+            </a:xfrm>
+            <a:custGeom>
+              <a:avLst/>
+              <a:gdLst/>
+              <a:ahLst/>
+              <a:cxnLst/>
+              <a:rect r="r" b="b" t="t" l="l"/>
+              <a:pathLst>
+                <a:path h="35941" w="15521051">
+                  <a:moveTo>
+                    <a:pt x="15521051" y="35941"/>
+                  </a:moveTo>
+                  <a:lnTo>
+                    <a:pt x="0" y="35941"/>
+                  </a:lnTo>
+                  <a:lnTo>
+                    <a:pt x="0" y="0"/>
+                  </a:lnTo>
+                  <a:lnTo>
+                    <a:pt x="15521051" y="0"/>
+                  </a:lnTo>
+                  <a:close/>
+                </a:path>
+              </a:pathLst>
+            </a:custGeom>
+            <a:solidFill>
+              <a:srgbClr val="000000"/>
+            </a:solidFill>
+            <a:ln w="12700">
+              <a:solidFill>
+                <a:srgbClr val="000000"/>
+              </a:solidFill>
+            </a:ln>
+          </p:spPr>
+        </p:sp>
+      </p:grpSp>
+      <p:grpSp>
+        <p:nvGrpSpPr>
+          <p:cNvPr name="Group 5" id="5"/>
+          <p:cNvGrpSpPr/>
+          <p:nvPr/>
+        </p:nvGrpSpPr>
+        <p:grpSpPr>
+          <a:xfrm rot="0">
+            <a:off x="1316698" y="9305630"/>
+            <a:ext cx="11694681" cy="53912"/>
+            <a:chOff x="0" y="0"/>
+            <a:chExt cx="15592908" cy="71882"/>
+          </a:xfrm>
+        </p:grpSpPr>
+        <p:sp>
+          <p:nvSpPr>
+            <p:cNvPr name="Freeform 6" id="6"/>
+            <p:cNvSpPr/>
+            <p:nvPr/>
+          </p:nvSpPr>
+          <p:spPr>
+            <a:xfrm flipH="false" flipV="false" rot="0">
+              <a:off x="35941" y="0"/>
+              <a:ext cx="15521051" cy="71882"/>
+            </a:xfrm>
+            <a:custGeom>
+              <a:avLst/>
+              <a:gdLst/>
+              <a:ahLst/>
+              <a:cxnLst/>
+              <a:rect r="r" b="b" t="t" l="l"/>
+              <a:pathLst>
+                <a:path h="71882" w="15521051">
+                  <a:moveTo>
+                    <a:pt x="15521051" y="71882"/>
+                  </a:moveTo>
+                  <a:lnTo>
+                    <a:pt x="0" y="71882"/>
+                  </a:lnTo>
+                  <a:lnTo>
+                    <a:pt x="0" y="0"/>
+                  </a:lnTo>
+                  <a:lnTo>
+                    <a:pt x="15521051" y="0"/>
+                  </a:lnTo>
+                  <a:close/>
+                </a:path>
+              </a:pathLst>
+            </a:custGeom>
+            <a:solidFill>
+              <a:srgbClr val="000000"/>
+            </a:solidFill>
+            <a:ln w="12700">
+              <a:solidFill>
+                <a:srgbClr val="000000"/>
+              </a:solidFill>
+            </a:ln>
+          </p:spPr>
+        </p:sp>
+      </p:grpSp>
+      <p:grpSp>
+        <p:nvGrpSpPr>
+          <p:cNvPr name="Group 7" id="7"/>
+          <p:cNvGrpSpPr/>
+          <p:nvPr/>
+        </p:nvGrpSpPr>
+        <p:grpSpPr>
+          <a:xfrm rot="0">
+            <a:off x="1503597" y="10084765"/>
+            <a:ext cx="53912" cy="16461657"/>
+            <a:chOff x="0" y="0"/>
+            <a:chExt cx="71882" cy="21948877"/>
+          </a:xfrm>
+        </p:grpSpPr>
+        <p:sp>
+          <p:nvSpPr>
+            <p:cNvPr name="Freeform 8" id="8"/>
+            <p:cNvSpPr/>
+            <p:nvPr/>
+          </p:nvSpPr>
+          <p:spPr>
+            <a:xfrm flipH="false" flipV="false" rot="0">
+              <a:off x="0" y="35941"/>
+              <a:ext cx="71882" cy="21877019"/>
+            </a:xfrm>
+            <a:custGeom>
+              <a:avLst/>
+              <a:gdLst/>
+              <a:ahLst/>
+              <a:cxnLst/>
+              <a:rect r="r" b="b" t="t" l="l"/>
+              <a:pathLst>
+                <a:path h="21877019" w="71882">
+                  <a:moveTo>
+                    <a:pt x="71882" y="0"/>
+                  </a:moveTo>
+                  <a:lnTo>
+                    <a:pt x="71882" y="21877019"/>
+                  </a:lnTo>
+                  <a:lnTo>
+                    <a:pt x="0" y="21877019"/>
+                  </a:lnTo>
+                  <a:lnTo>
+                    <a:pt x="0" y="0"/>
+                  </a:lnTo>
+                  <a:close/>
+                </a:path>
+              </a:pathLst>
+            </a:custGeom>
+            <a:solidFill>
+              <a:srgbClr val="000000"/>
+            </a:solidFill>
+            <a:ln w="12700">
+              <a:solidFill>
+                <a:srgbClr val="000000"/>
+              </a:solidFill>
+            </a:ln>
+          </p:spPr>
+        </p:sp>
+      </p:grpSp>
+      <p:sp>
+        <p:nvSpPr>
+          <p:cNvPr name="Freeform 9" id="9"/>
           <p:cNvSpPr/>
           <p:nvPr/>
         </p:nvSpPr>
         <p:spPr>
           <a:xfrm flipH="false" flipV="false" rot="0">
-            <a:off x="1801628" y="1591499"/>
-            <a:ext cx="7517320" cy="7517320"/>
+            <a:off x="1388340" y="9830540"/>
+            <a:ext cx="284433" cy="284433"/>
           </a:xfrm>
           <a:custGeom>
             <a:avLst/>
@@ -3155,18 +3323,18 @@
             <a:cxnLst/>
             <a:rect r="r" b="b" t="t" l="l"/>
             <a:pathLst>
-              <a:path h="7517320" w="7517320">
+              <a:path h="284433" w="284433">
                 <a:moveTo>
                   <a:pt x="0" y="0"/>
                 </a:moveTo>
                 <a:lnTo>
-                  <a:pt x="7517320" y="0"/>
+                  <a:pt x="284433" y="0"/>
                 </a:lnTo>
                 <a:lnTo>
-                  <a:pt x="7517320" y="7517320"/>
+                  <a:pt x="284433" y="284433"/>
                 </a:lnTo>
                 <a:lnTo>
-                  <a:pt x="0" y="7517320"/>
+                  <a:pt x="0" y="284433"/>
                 </a:lnTo>
                 <a:lnTo>
                   <a:pt x="0" y="0"/>
@@ -3189,85 +3357,16 @@
           </a:blipFill>
         </p:spPr>
       </p:sp>
-      <p:grpSp>
-        <p:nvGrpSpPr>
-          <p:cNvPr name="Group 4" id="4"/>
-          <p:cNvGrpSpPr/>
-          <p:nvPr/>
-        </p:nvGrpSpPr>
-        <p:grpSpPr>
-          <a:xfrm rot="0">
-            <a:off x="2138400" y="1949880"/>
-            <a:ext cx="6447272" cy="6447272"/>
-            <a:chOff x="0" y="0"/>
-            <a:chExt cx="8596363" cy="8596363"/>
-          </a:xfrm>
-        </p:grpSpPr>
-        <p:sp>
-          <p:nvSpPr>
-            <p:cNvPr name="Freeform 5" id="5"/>
-            <p:cNvSpPr/>
-            <p:nvPr/>
-          </p:nvSpPr>
-          <p:spPr>
-            <a:xfrm flipH="false" flipV="false" rot="0">
-              <a:off x="0" y="0"/>
-              <a:ext cx="8596376" cy="8596376"/>
-            </a:xfrm>
-            <a:custGeom>
-              <a:avLst/>
-              <a:gdLst/>
-              <a:ahLst/>
-              <a:cxnLst/>
-              <a:rect r="r" b="b" t="t" l="l"/>
-              <a:pathLst>
-                <a:path h="8596376" w="8596376">
-                  <a:moveTo>
-                    <a:pt x="4298188" y="0"/>
-                  </a:moveTo>
-                  <a:cubicBezTo>
-                    <a:pt x="1924304" y="0"/>
-                    <a:pt x="0" y="1924304"/>
-                    <a:pt x="0" y="4298188"/>
-                  </a:cubicBezTo>
-                  <a:cubicBezTo>
-                    <a:pt x="0" y="6672072"/>
-                    <a:pt x="1924304" y="8596376"/>
-                    <a:pt x="4298188" y="8596376"/>
-                  </a:cubicBezTo>
-                  <a:cubicBezTo>
-                    <a:pt x="6672072" y="8596376"/>
-                    <a:pt x="8596376" y="6671945"/>
-                    <a:pt x="8596376" y="4298188"/>
-                  </a:cubicBezTo>
-                  <a:cubicBezTo>
-                    <a:pt x="8596376" y="1924431"/>
-                    <a:pt x="6671945" y="0"/>
-                    <a:pt x="4298188" y="0"/>
-                  </a:cubicBezTo>
-                  <a:close/>
-                </a:path>
-              </a:pathLst>
-            </a:custGeom>
-            <a:blipFill>
-              <a:blip r:embed="rId6"/>
-              <a:stretch>
-                <a:fillRect l="-23156" t="0" r="-23155" b="0"/>
-              </a:stretch>
-            </a:blipFill>
-          </p:spPr>
-        </p:sp>
-      </p:grpSp>
-      <p:sp>
-        <p:nvSpPr>
-          <p:cNvPr name="Freeform 6" id="6"/>
+      <p:sp>
+        <p:nvSpPr>
+          <p:cNvPr name="Freeform 10" id="10"/>
           <p:cNvSpPr/>
           <p:nvPr/>
         </p:nvSpPr>
         <p:spPr>
           <a:xfrm flipH="false" flipV="false" rot="0">
-            <a:off x="10319734" y="7733828"/>
-            <a:ext cx="9365700" cy="1706705"/>
+            <a:off x="1388340" y="15978851"/>
+            <a:ext cx="284433" cy="284433"/>
           </a:xfrm>
           <a:custGeom>
             <a:avLst/>
@@ -3276,18 +3375,18 @@
             <a:cxnLst/>
             <a:rect r="r" b="b" t="t" l="l"/>
             <a:pathLst>
-              <a:path h="1706705" w="9365700">
+              <a:path h="284433" w="284433">
                 <a:moveTo>
                   <a:pt x="0" y="0"/>
                 </a:moveTo>
                 <a:lnTo>
-                  <a:pt x="9365701" y="0"/>
+                  <a:pt x="284433" y="0"/>
                 </a:lnTo>
                 <a:lnTo>
-                  <a:pt x="9365701" y="1706705"/>
+                  <a:pt x="284433" y="284433"/>
                 </a:lnTo>
                 <a:lnTo>
-                  <a:pt x="0" y="1706705"/>
+                  <a:pt x="0" y="284433"/>
                 </a:lnTo>
                 <a:lnTo>
                   <a:pt x="0" y="0"/>
@@ -3297,10 +3396,10 @@
             </a:pathLst>
           </a:custGeom>
           <a:blipFill>
-            <a:blip r:embed="rId7">
+            <a:blip r:embed="rId4">
               <a:extLst>
                 <a:ext uri="{96DAC541-7B7A-43D3-8B79-37D633B846F1}">
-                  <asvg:svgBlip xmlns:asvg="http://schemas.microsoft.com/office/drawing/2016/SVG/main" r:embed="rId8"/>
+                  <asvg:svgBlip xmlns:asvg="http://schemas.microsoft.com/office/drawing/2016/SVG/main" r:embed="rId5"/>
                 </a:ext>
               </a:extLst>
             </a:blip>
@@ -3312,14 +3411,14 @@
       </p:sp>
       <p:sp>
         <p:nvSpPr>
-          <p:cNvPr name="Freeform 7" id="7"/>
+          <p:cNvPr name="Freeform 11" id="11"/>
           <p:cNvSpPr/>
           <p:nvPr/>
         </p:nvSpPr>
         <p:spPr>
           <a:xfrm flipH="false" flipV="false" rot="0">
-            <a:off x="1104885" y="22729052"/>
-            <a:ext cx="7679042" cy="1706705"/>
+            <a:off x="1388340" y="22168660"/>
+            <a:ext cx="284433" cy="284433"/>
           </a:xfrm>
           <a:custGeom>
             <a:avLst/>
@@ -3328,18 +3427,18 @@
             <a:cxnLst/>
             <a:rect r="r" b="b" t="t" l="l"/>
             <a:pathLst>
-              <a:path h="1706705" w="7679042">
+              <a:path h="284433" w="284433">
                 <a:moveTo>
                   <a:pt x="0" y="0"/>
                 </a:moveTo>
                 <a:lnTo>
-                  <a:pt x="7679041" y="0"/>
+                  <a:pt x="284433" y="0"/>
                 </a:lnTo>
                 <a:lnTo>
-                  <a:pt x="7679041" y="1706705"/>
+                  <a:pt x="284433" y="284433"/>
                 </a:lnTo>
                 <a:lnTo>
-                  <a:pt x="0" y="1706705"/>
+                  <a:pt x="0" y="284433"/>
                 </a:lnTo>
                 <a:lnTo>
                   <a:pt x="0" y="0"/>
@@ -3349,10 +3448,10 @@
             </a:pathLst>
           </a:custGeom>
           <a:blipFill>
-            <a:blip r:embed="rId9">
+            <a:blip r:embed="rId4">
               <a:extLst>
                 <a:ext uri="{96DAC541-7B7A-43D3-8B79-37D633B846F1}">
-                  <asvg:svgBlip xmlns:asvg="http://schemas.microsoft.com/office/drawing/2016/SVG/main" r:embed="rId10"/>
+                  <asvg:svgBlip xmlns:asvg="http://schemas.microsoft.com/office/drawing/2016/SVG/main" r:embed="rId5"/>
                 </a:ext>
               </a:extLst>
             </a:blip>
@@ -3364,14 +3463,294 @@
       </p:sp>
       <p:sp>
         <p:nvSpPr>
-          <p:cNvPr name="Freeform 8" id="8"/>
+          <p:cNvPr name="TextBox 12" id="12"/>
+          <p:cNvSpPr txBox="true"/>
+          <p:nvPr/>
+        </p:nvSpPr>
+        <p:spPr>
+          <a:xfrm rot="0">
+            <a:off x="1439542" y="3797265"/>
+            <a:ext cx="11640779" cy="471049"/>
+          </a:xfrm>
+          <a:prstGeom prst="rect">
+            <a:avLst/>
+          </a:prstGeom>
+        </p:spPr>
+        <p:txBody>
+          <a:bodyPr anchor="t" rtlCol="false" tIns="0" lIns="0" bIns="0" rIns="0">
+            <a:spAutoFit/>
+          </a:bodyPr>
+          <a:lstStyle/>
+          <a:p>
+            <a:pPr algn="l">
+              <a:lnSpc>
+                <a:spcPts val="3961"/>
+              </a:lnSpc>
+            </a:pPr>
+            <a:r>
+              <a:rPr lang="en-US" sz="2829" spc="220">
+                <a:solidFill>
+                  <a:srgbClr val="000000"/>
+                </a:solidFill>
+                <a:latin typeface="Montserrat"/>
+                <a:ea typeface="Montserrat"/>
+                <a:cs typeface="Montserrat"/>
+                <a:sym typeface="Montserrat"/>
+              </a:rPr>
+              <a:t>{{title}}</a:t>
+            </a:r>
+          </a:p>
+        </p:txBody>
+      </p:sp>
+      <p:sp>
+        <p:nvSpPr>
+          <p:cNvPr name="TextBox 13" id="13"/>
+          <p:cNvSpPr txBox="true"/>
+          <p:nvPr/>
+        </p:nvSpPr>
+        <p:spPr>
+          <a:xfrm rot="0">
+            <a:off x="1391593" y="1208294"/>
+            <a:ext cx="11640779" cy="1220413"/>
+          </a:xfrm>
+          <a:prstGeom prst="rect">
+            <a:avLst/>
+          </a:prstGeom>
+        </p:spPr>
+        <p:txBody>
+          <a:bodyPr anchor="t" rtlCol="false" tIns="0" lIns="0" bIns="0" rIns="0">
+            <a:spAutoFit/>
+          </a:bodyPr>
+          <a:lstStyle/>
+          <a:p>
+            <a:pPr algn="l">
+              <a:lnSpc>
+                <a:spcPts val="9901"/>
+              </a:lnSpc>
+            </a:pPr>
+            <a:r>
+              <a:rPr lang="en-US" b="true" sz="7071" spc="548">
+                <a:solidFill>
+                  <a:srgbClr val="2B554E"/>
+                </a:solidFill>
+                <a:latin typeface="Montserrat Bold"/>
+                <a:ea typeface="Montserrat Bold"/>
+                <a:cs typeface="Montserrat Bold"/>
+                <a:sym typeface="Montserrat Bold"/>
+              </a:rPr>
+              <a:t>{{name}}</a:t>
+            </a:r>
+          </a:p>
+        </p:txBody>
+      </p:sp>
+      <p:sp>
+        <p:nvSpPr>
+          <p:cNvPr name="TextBox 14" id="14"/>
+          <p:cNvSpPr txBox="true"/>
+          <p:nvPr/>
+        </p:nvSpPr>
+        <p:spPr>
+          <a:xfrm rot="0">
+            <a:off x="1439542" y="4767092"/>
+            <a:ext cx="11640779" cy="4762884"/>
+          </a:xfrm>
+          <a:prstGeom prst="rect">
+            <a:avLst/>
+          </a:prstGeom>
+        </p:spPr>
+        <p:txBody>
+          <a:bodyPr anchor="t" rtlCol="false" tIns="0" lIns="0" bIns="0" rIns="0">
+            <a:spAutoFit/>
+          </a:bodyPr>
+          <a:lstStyle/>
+          <a:p>
+            <a:pPr algn="just">
+              <a:lnSpc>
+                <a:spcPts val="4210"/>
+              </a:lnSpc>
+            </a:pPr>
+            <a:r>
+              <a:rPr lang="en-US" sz="2449" i="true" spc="48">
+                <a:solidFill>
+                  <a:srgbClr val="000000"/>
+                </a:solidFill>
+                <a:latin typeface="Montserrat Italics"/>
+                <a:ea typeface="Montserrat Italics"/>
+                <a:cs typeface="Montserrat Italics"/>
+                <a:sym typeface="Montserrat Italics"/>
+              </a:rPr>
+              <a:t>{{about}}</a:t>
+            </a:r>
+          </a:p>
+          <a:p>
+            <a:pPr algn="just">
+              <a:lnSpc>
+                <a:spcPts val="4210"/>
+              </a:lnSpc>
+            </a:pPr>
+          </a:p>
+          <a:p>
+            <a:pPr algn="just">
+              <a:lnSpc>
+                <a:spcPts val="4210"/>
+              </a:lnSpc>
+            </a:pPr>
+          </a:p>
+          <a:p>
+            <a:pPr algn="just">
+              <a:lnSpc>
+                <a:spcPts val="4210"/>
+              </a:lnSpc>
+            </a:pPr>
+          </a:p>
+          <a:p>
+            <a:pPr algn="just">
+              <a:lnSpc>
+                <a:spcPts val="4210"/>
+              </a:lnSpc>
+            </a:pPr>
+          </a:p>
+          <a:p>
+            <a:pPr algn="just">
+              <a:lnSpc>
+                <a:spcPts val="4210"/>
+              </a:lnSpc>
+            </a:pPr>
+          </a:p>
+          <a:p>
+            <a:pPr algn="just">
+              <a:lnSpc>
+                <a:spcPts val="4210"/>
+              </a:lnSpc>
+            </a:pPr>
+          </a:p>
+          <a:p>
+            <a:pPr algn="just">
+              <a:lnSpc>
+                <a:spcPts val="4210"/>
+              </a:lnSpc>
+            </a:pPr>
+          </a:p>
+          <a:p>
+            <a:pPr algn="just">
+              <a:lnSpc>
+                <a:spcPts val="4212"/>
+              </a:lnSpc>
+            </a:pPr>
+          </a:p>
+        </p:txBody>
+      </p:sp>
+      <p:sp>
+        <p:nvSpPr>
+          <p:cNvPr name="TextBox 15" id="15"/>
+          <p:cNvSpPr txBox="true"/>
+          <p:nvPr/>
+        </p:nvSpPr>
+        <p:spPr>
+          <a:xfrm rot="0">
+            <a:off x="1445905" y="8550478"/>
+            <a:ext cx="8862812" cy="627307"/>
+          </a:xfrm>
+          <a:prstGeom prst="rect">
+            <a:avLst/>
+          </a:prstGeom>
+        </p:spPr>
+        <p:txBody>
+          <a:bodyPr anchor="t" rtlCol="false" tIns="0" lIns="0" bIns="0" rIns="0">
+            <a:spAutoFit/>
+          </a:bodyPr>
+          <a:lstStyle/>
+          <a:p>
+            <a:pPr algn="l">
+              <a:lnSpc>
+                <a:spcPts val="4751"/>
+              </a:lnSpc>
+            </a:pPr>
+            <a:r>
+              <a:rPr lang="en-US" sz="3395" b="true">
+                <a:solidFill>
+                  <a:srgbClr val="2B554E"/>
+                </a:solidFill>
+                <a:latin typeface="Montserrat Bold"/>
+                <a:ea typeface="Montserrat Bold"/>
+                <a:cs typeface="Montserrat Bold"/>
+                <a:sym typeface="Montserrat Bold"/>
+              </a:rPr>
+              <a:t>Experiencia Laboral</a:t>
+            </a:r>
+          </a:p>
+        </p:txBody>
+      </p:sp>
+      <p:grpSp>
+        <p:nvGrpSpPr>
+          <p:cNvPr name="Group 16" id="16"/>
+          <p:cNvGrpSpPr/>
+          <p:nvPr/>
+        </p:nvGrpSpPr>
+        <p:grpSpPr>
+          <a:xfrm rot="0">
+            <a:off x="15253106" y="7628792"/>
+            <a:ext cx="5114011" cy="53912"/>
+            <a:chOff x="0" y="0"/>
+            <a:chExt cx="6818681" cy="71882"/>
+          </a:xfrm>
+        </p:grpSpPr>
+        <p:sp>
+          <p:nvSpPr>
+            <p:cNvPr name="Freeform 17" id="17"/>
+            <p:cNvSpPr/>
+            <p:nvPr/>
+          </p:nvSpPr>
+          <p:spPr>
+            <a:xfrm flipH="false" flipV="false" rot="0">
+              <a:off x="47879" y="0"/>
+              <a:ext cx="6746875" cy="95885"/>
+            </a:xfrm>
+            <a:custGeom>
+              <a:avLst/>
+              <a:gdLst/>
+              <a:ahLst/>
+              <a:cxnLst/>
+              <a:rect r="r" b="b" t="t" l="l"/>
+              <a:pathLst>
+                <a:path h="95885" w="6746875">
+                  <a:moveTo>
+                    <a:pt x="6746875" y="95885"/>
+                  </a:moveTo>
+                  <a:lnTo>
+                    <a:pt x="0" y="95885"/>
+                  </a:lnTo>
+                  <a:lnTo>
+                    <a:pt x="0" y="0"/>
+                  </a:lnTo>
+                  <a:lnTo>
+                    <a:pt x="6746875" y="0"/>
+                  </a:lnTo>
+                  <a:close/>
+                </a:path>
+              </a:pathLst>
+            </a:custGeom>
+            <a:solidFill>
+              <a:srgbClr val="FFFFFF"/>
+            </a:solidFill>
+            <a:ln w="12700">
+              <a:solidFill>
+                <a:srgbClr val="000000"/>
+              </a:solidFill>
+            </a:ln>
+          </p:spPr>
+        </p:sp>
+      </p:grpSp>
+      <p:sp>
+        <p:nvSpPr>
+          <p:cNvPr name="Freeform 18" id="18"/>
           <p:cNvSpPr/>
           <p:nvPr/>
         </p:nvSpPr>
         <p:spPr>
           <a:xfrm flipH="false" flipV="false" rot="0">
-            <a:off x="1104885" y="17039894"/>
-            <a:ext cx="7679042" cy="1706705"/>
+            <a:off x="15270851" y="8186728"/>
+            <a:ext cx="695039" cy="695038"/>
           </a:xfrm>
           <a:custGeom>
             <a:avLst/>
@@ -3380,18 +3759,18 @@
             <a:cxnLst/>
             <a:rect r="r" b="b" t="t" l="l"/>
             <a:pathLst>
-              <a:path h="1706705" w="7679042">
+              <a:path h="695038" w="695039">
                 <a:moveTo>
                   <a:pt x="0" y="0"/>
                 </a:moveTo>
                 <a:lnTo>
-                  <a:pt x="7679041" y="0"/>
+                  <a:pt x="695038" y="0"/>
                 </a:lnTo>
                 <a:lnTo>
-                  <a:pt x="7679041" y="1706705"/>
+                  <a:pt x="695038" y="695039"/>
                 </a:lnTo>
                 <a:lnTo>
-                  <a:pt x="0" y="1706705"/>
+                  <a:pt x="0" y="695039"/>
                 </a:lnTo>
                 <a:lnTo>
                   <a:pt x="0" y="0"/>
@@ -3401,10 +3780,10 @@
             </a:pathLst>
           </a:custGeom>
           <a:blipFill>
-            <a:blip r:embed="rId9">
+            <a:blip r:embed="rId6">
               <a:extLst>
                 <a:ext uri="{96DAC541-7B7A-43D3-8B79-37D633B846F1}">
-                  <asvg:svgBlip xmlns:asvg="http://schemas.microsoft.com/office/drawing/2016/SVG/main" r:embed="rId10"/>
+                  <asvg:svgBlip xmlns:asvg="http://schemas.microsoft.com/office/drawing/2016/SVG/main" r:embed="rId7"/>
                 </a:ext>
               </a:extLst>
             </a:blip>
@@ -3416,14 +3795,14 @@
       </p:sp>
       <p:sp>
         <p:nvSpPr>
-          <p:cNvPr name="Freeform 9" id="9"/>
+          <p:cNvPr name="Freeform 19" id="19"/>
           <p:cNvSpPr/>
           <p:nvPr/>
         </p:nvSpPr>
         <p:spPr>
           <a:xfrm flipH="false" flipV="false" rot="0">
-            <a:off x="10517308" y="24186403"/>
-            <a:ext cx="9168127" cy="1706705"/>
+            <a:off x="15270851" y="9156696"/>
+            <a:ext cx="695039" cy="695038"/>
           </a:xfrm>
           <a:custGeom>
             <a:avLst/>
@@ -3432,18 +3811,18 @@
             <a:cxnLst/>
             <a:rect r="r" b="b" t="t" l="l"/>
             <a:pathLst>
-              <a:path h="1706705" w="9168127">
+              <a:path h="695038" w="695039">
                 <a:moveTo>
                   <a:pt x="0" y="0"/>
                 </a:moveTo>
                 <a:lnTo>
-                  <a:pt x="9168127" y="0"/>
+                  <a:pt x="695038" y="0"/>
                 </a:lnTo>
                 <a:lnTo>
-                  <a:pt x="9168127" y="1706706"/>
+                  <a:pt x="695038" y="695039"/>
                 </a:lnTo>
                 <a:lnTo>
-                  <a:pt x="0" y="1706706"/>
+                  <a:pt x="0" y="695039"/>
                 </a:lnTo>
                 <a:lnTo>
                   <a:pt x="0" y="0"/>
@@ -3453,10 +3832,10 @@
             </a:pathLst>
           </a:custGeom>
           <a:blipFill>
-            <a:blip r:embed="rId11">
+            <a:blip r:embed="rId6">
               <a:extLst>
                 <a:ext uri="{96DAC541-7B7A-43D3-8B79-37D633B846F1}">
-                  <asvg:svgBlip xmlns:asvg="http://schemas.microsoft.com/office/drawing/2016/SVG/main" r:embed="rId12"/>
+                  <asvg:svgBlip xmlns:asvg="http://schemas.microsoft.com/office/drawing/2016/SVG/main" r:embed="rId7"/>
                 </a:ext>
               </a:extLst>
             </a:blip>
@@ -3468,14 +3847,14 @@
       </p:sp>
       <p:sp>
         <p:nvSpPr>
-          <p:cNvPr name="Freeform 10" id="10"/>
+          <p:cNvPr name="Freeform 20" id="20"/>
           <p:cNvSpPr/>
           <p:nvPr/>
         </p:nvSpPr>
         <p:spPr>
           <a:xfrm flipH="false" flipV="false" rot="0">
-            <a:off x="-893058" y="29766312"/>
-            <a:ext cx="23314778" cy="1313301"/>
+            <a:off x="15446473" y="8419662"/>
+            <a:ext cx="351958" cy="270691"/>
           </a:xfrm>
           <a:custGeom>
             <a:avLst/>
@@ -3484,18 +3863,18 @@
             <a:cxnLst/>
             <a:rect r="r" b="b" t="t" l="l"/>
             <a:pathLst>
-              <a:path h="1313301" w="23314778">
+              <a:path h="270691" w="351958">
                 <a:moveTo>
                   <a:pt x="0" y="0"/>
                 </a:moveTo>
                 <a:lnTo>
-                  <a:pt x="23314778" y="0"/>
+                  <a:pt x="351959" y="0"/>
                 </a:lnTo>
                 <a:lnTo>
-                  <a:pt x="23314778" y="1313300"/>
+                  <a:pt x="351959" y="270691"/>
                 </a:lnTo>
                 <a:lnTo>
-                  <a:pt x="0" y="1313300"/>
+                  <a:pt x="0" y="270691"/>
                 </a:lnTo>
                 <a:lnTo>
                   <a:pt x="0" y="0"/>
@@ -3505,10 +3884,62 @@
             </a:pathLst>
           </a:custGeom>
           <a:blipFill>
-            <a:blip r:embed="rId13">
+            <a:blip r:embed="rId8">
               <a:extLst>
                 <a:ext uri="{96DAC541-7B7A-43D3-8B79-37D633B846F1}">
-                  <asvg:svgBlip xmlns:asvg="http://schemas.microsoft.com/office/drawing/2016/SVG/main" r:embed="rId14"/>
+                  <asvg:svgBlip xmlns:asvg="http://schemas.microsoft.com/office/drawing/2016/SVG/main" r:embed="rId9"/>
+                </a:ext>
+              </a:extLst>
+            </a:blip>
+            <a:stretch>
+              <a:fillRect l="0" t="-2712" r="0" b="-2709"/>
+            </a:stretch>
+          </a:blipFill>
+        </p:spPr>
+      </p:sp>
+      <p:sp>
+        <p:nvSpPr>
+          <p:cNvPr name="Freeform 21" id="21"/>
+          <p:cNvSpPr/>
+          <p:nvPr/>
+        </p:nvSpPr>
+        <p:spPr>
+          <a:xfrm flipH="false" flipV="false" rot="0">
+            <a:off x="15280057" y="10121267"/>
+            <a:ext cx="695039" cy="695038"/>
+          </a:xfrm>
+          <a:custGeom>
+            <a:avLst/>
+            <a:gdLst/>
+            <a:ahLst/>
+            <a:cxnLst/>
+            <a:rect r="r" b="b" t="t" l="l"/>
+            <a:pathLst>
+              <a:path h="695038" w="695039">
+                <a:moveTo>
+                  <a:pt x="0" y="0"/>
+                </a:moveTo>
+                <a:lnTo>
+                  <a:pt x="695039" y="0"/>
+                </a:lnTo>
+                <a:lnTo>
+                  <a:pt x="695039" y="695038"/>
+                </a:lnTo>
+                <a:lnTo>
+                  <a:pt x="0" y="695038"/>
+                </a:lnTo>
+                <a:lnTo>
+                  <a:pt x="0" y="0"/>
+                </a:lnTo>
+                <a:close/>
+              </a:path>
+            </a:pathLst>
+          </a:custGeom>
+          <a:blipFill>
+            <a:blip r:embed="rId6">
+              <a:extLst>
+                <a:ext uri="{96DAC541-7B7A-43D3-8B79-37D633B846F1}">
+                  <asvg:svgBlip xmlns:asvg="http://schemas.microsoft.com/office/drawing/2016/SVG/main" r:embed="rId7"/>
                 </a:ext>
               </a:extLst>
             </a:blip>
@@ -3520,14 +3951,222 @@
       </p:sp>
       <p:sp>
         <p:nvSpPr>
-          <p:cNvPr name="TextBox 11" id="11"/>
+          <p:cNvPr name="Freeform 22" id="22"/>
+          <p:cNvSpPr/>
+          <p:nvPr/>
+        </p:nvSpPr>
+        <p:spPr>
+          <a:xfrm flipH="false" flipV="false" rot="0">
+            <a:off x="15280057" y="11085840"/>
+            <a:ext cx="695039" cy="695038"/>
+          </a:xfrm>
+          <a:custGeom>
+            <a:avLst/>
+            <a:gdLst/>
+            <a:ahLst/>
+            <a:cxnLst/>
+            <a:rect r="r" b="b" t="t" l="l"/>
+            <a:pathLst>
+              <a:path h="695038" w="695039">
+                <a:moveTo>
+                  <a:pt x="0" y="0"/>
+                </a:moveTo>
+                <a:lnTo>
+                  <a:pt x="695039" y="0"/>
+                </a:lnTo>
+                <a:lnTo>
+                  <a:pt x="695039" y="695038"/>
+                </a:lnTo>
+                <a:lnTo>
+                  <a:pt x="0" y="695038"/>
+                </a:lnTo>
+                <a:lnTo>
+                  <a:pt x="0" y="0"/>
+                </a:lnTo>
+                <a:close/>
+              </a:path>
+            </a:pathLst>
+          </a:custGeom>
+          <a:blipFill>
+            <a:blip r:embed="rId6">
+              <a:extLst>
+                <a:ext uri="{96DAC541-7B7A-43D3-8B79-37D633B846F1}">
+                  <asvg:svgBlip xmlns:asvg="http://schemas.microsoft.com/office/drawing/2016/SVG/main" r:embed="rId7"/>
+                </a:ext>
+              </a:extLst>
+            </a:blip>
+            <a:stretch>
+              <a:fillRect l="0" t="0" r="0" b="0"/>
+            </a:stretch>
+          </a:blipFill>
+        </p:spPr>
+      </p:sp>
+      <p:sp>
+        <p:nvSpPr>
+          <p:cNvPr name="Freeform 23" id="23"/>
+          <p:cNvSpPr/>
+          <p:nvPr/>
+        </p:nvSpPr>
+        <p:spPr>
+          <a:xfrm flipH="false" flipV="false" rot="0">
+            <a:off x="15500204" y="10297211"/>
+            <a:ext cx="250184" cy="343148"/>
+          </a:xfrm>
+          <a:custGeom>
+            <a:avLst/>
+            <a:gdLst/>
+            <a:ahLst/>
+            <a:cxnLst/>
+            <a:rect r="r" b="b" t="t" l="l"/>
+            <a:pathLst>
+              <a:path h="343148" w="250184">
+                <a:moveTo>
+                  <a:pt x="0" y="0"/>
+                </a:moveTo>
+                <a:lnTo>
+                  <a:pt x="250184" y="0"/>
+                </a:lnTo>
+                <a:lnTo>
+                  <a:pt x="250184" y="343147"/>
+                </a:lnTo>
+                <a:lnTo>
+                  <a:pt x="0" y="343147"/>
+                </a:lnTo>
+                <a:lnTo>
+                  <a:pt x="0" y="0"/>
+                </a:lnTo>
+                <a:close/>
+              </a:path>
+            </a:pathLst>
+          </a:custGeom>
+          <a:blipFill>
+            <a:blip r:embed="rId10">
+              <a:extLst>
+                <a:ext uri="{96DAC541-7B7A-43D3-8B79-37D633B846F1}">
+                  <asvg:svgBlip xmlns:asvg="http://schemas.microsoft.com/office/drawing/2016/SVG/main" r:embed="rId11"/>
+                </a:ext>
+              </a:extLst>
+            </a:blip>
+            <a:stretch>
+              <a:fillRect l="-45" t="0" r="-45" b="0"/>
+            </a:stretch>
+          </a:blipFill>
+        </p:spPr>
+      </p:sp>
+      <p:sp>
+        <p:nvSpPr>
+          <p:cNvPr name="Freeform 24" id="24"/>
+          <p:cNvSpPr/>
+          <p:nvPr/>
+        </p:nvSpPr>
+        <p:spPr>
+          <a:xfrm flipH="false" flipV="false" rot="0">
+            <a:off x="15446473" y="11262627"/>
+            <a:ext cx="362198" cy="362198"/>
+          </a:xfrm>
+          <a:custGeom>
+            <a:avLst/>
+            <a:gdLst/>
+            <a:ahLst/>
+            <a:cxnLst/>
+            <a:rect r="r" b="b" t="t" l="l"/>
+            <a:pathLst>
+              <a:path h="362198" w="362198">
+                <a:moveTo>
+                  <a:pt x="0" y="0"/>
+                </a:moveTo>
+                <a:lnTo>
+                  <a:pt x="362198" y="0"/>
+                </a:lnTo>
+                <a:lnTo>
+                  <a:pt x="362198" y="362197"/>
+                </a:lnTo>
+                <a:lnTo>
+                  <a:pt x="0" y="362197"/>
+                </a:lnTo>
+                <a:lnTo>
+                  <a:pt x="0" y="0"/>
+                </a:lnTo>
+                <a:close/>
+              </a:path>
+            </a:pathLst>
+          </a:custGeom>
+          <a:blipFill>
+            <a:blip r:embed="rId12">
+              <a:extLst>
+                <a:ext uri="{96DAC541-7B7A-43D3-8B79-37D633B846F1}">
+                  <asvg:svgBlip xmlns:asvg="http://schemas.microsoft.com/office/drawing/2016/SVG/main" r:embed="rId13"/>
+                </a:ext>
+              </a:extLst>
+            </a:blip>
+            <a:stretch>
+              <a:fillRect l="0" t="0" r="0" b="0"/>
+            </a:stretch>
+          </a:blipFill>
+        </p:spPr>
+      </p:sp>
+      <p:sp>
+        <p:nvSpPr>
+          <p:cNvPr name="Freeform 25" id="25"/>
+          <p:cNvSpPr/>
+          <p:nvPr/>
+        </p:nvSpPr>
+        <p:spPr>
+          <a:xfrm flipH="false" flipV="false" rot="0">
+            <a:off x="15403916" y="9333786"/>
+            <a:ext cx="447323" cy="356225"/>
+          </a:xfrm>
+          <a:custGeom>
+            <a:avLst/>
+            <a:gdLst/>
+            <a:ahLst/>
+            <a:cxnLst/>
+            <a:rect r="r" b="b" t="t" l="l"/>
+            <a:pathLst>
+              <a:path h="356225" w="447323">
+                <a:moveTo>
+                  <a:pt x="0" y="0"/>
+                </a:moveTo>
+                <a:lnTo>
+                  <a:pt x="447322" y="0"/>
+                </a:lnTo>
+                <a:lnTo>
+                  <a:pt x="447322" y="356225"/>
+                </a:lnTo>
+                <a:lnTo>
+                  <a:pt x="0" y="356225"/>
+                </a:lnTo>
+                <a:lnTo>
+                  <a:pt x="0" y="0"/>
+                </a:lnTo>
+                <a:close/>
+              </a:path>
+            </a:pathLst>
+          </a:custGeom>
+          <a:blipFill>
+            <a:blip r:embed="rId14">
+              <a:extLst>
+                <a:ext uri="{96DAC541-7B7A-43D3-8B79-37D633B846F1}">
+                  <asvg:svgBlip xmlns:asvg="http://schemas.microsoft.com/office/drawing/2016/SVG/main" r:embed="rId15"/>
+                </a:ext>
+              </a:extLst>
+            </a:blip>
+            <a:stretch>
+              <a:fillRect l="-295" t="0" r="-295" b="0"/>
+            </a:stretch>
+          </a:blipFill>
+        </p:spPr>
+      </p:sp>
+      <p:sp>
+        <p:nvSpPr>
+          <p:cNvPr name="TextBox 26" id="26"/>
           <p:cNvSpPr txBox="true"/>
           <p:nvPr/>
         </p:nvSpPr>
         <p:spPr>
           <a:xfrm rot="0">
-            <a:off x="915727" y="27110611"/>
-            <a:ext cx="6935391" cy="543243"/>
+            <a:off x="16296932" y="9321336"/>
+            <a:ext cx="3259884" cy="336318"/>
           </a:xfrm>
           <a:prstGeom prst="rect">
             <a:avLst/>
@@ -3541,46 +4180,34 @@
           <a:p>
             <a:pPr algn="l">
               <a:lnSpc>
-                <a:spcPts val="4374"/>
+                <a:spcPts val="2784"/>
               </a:lnSpc>
             </a:pPr>
             <a:r>
-              <a:rPr lang="en-US" sz="2897">
+              <a:rPr lang="en-US" sz="2263">
                 <a:solidFill>
-                  <a:srgbClr val="202021"/>
+                  <a:srgbClr val="FFFFFF"/>
                 </a:solidFill>
-                <a:latin typeface="Poppins"/>
-                <a:ea typeface="Poppins"/>
-                <a:cs typeface="Poppins"/>
-                <a:sym typeface="Poppins"/>
+                <a:latin typeface="Montserrat"/>
+                <a:ea typeface="Montserrat"/>
+                <a:cs typeface="Montserrat"/>
+                <a:sym typeface="Montserrat"/>
               </a:rPr>
-              <a:t>{{edu_2_sch</a:t>
-            </a:r>
-            <a:r>
-              <a:rPr lang="en-US" sz="2897">
-                <a:solidFill>
-                  <a:srgbClr val="202021"/>
-                </a:solidFill>
-                <a:latin typeface="Poppins"/>
-                <a:ea typeface="Poppins"/>
-                <a:cs typeface="Poppins"/>
-                <a:sym typeface="Poppins"/>
-              </a:rPr>
-              <a:t>ool}}</a:t>
-            </a:r>
-          </a:p>
-        </p:txBody>
-      </p:sp>
-      <p:sp>
-        <p:nvSpPr>
-          <p:cNvPr name="TextBox 12" id="12"/>
+              <a:t>Licencia de conducir</a:t>
+            </a:r>
+          </a:p>
+        </p:txBody>
+      </p:sp>
+      <p:sp>
+        <p:nvSpPr>
+          <p:cNvPr name="TextBox 27" id="27"/>
           <p:cNvSpPr txBox="true"/>
           <p:nvPr/>
         </p:nvSpPr>
         <p:spPr>
           <a:xfrm rot="0">
-            <a:off x="2270830" y="22977728"/>
-            <a:ext cx="5347150" cy="1190303"/>
+            <a:off x="16296932" y="8354063"/>
+            <a:ext cx="4008072" cy="353325"/>
           </a:xfrm>
           <a:prstGeom prst="rect">
             <a:avLst/>
@@ -3592,48 +4219,36 @@
           </a:bodyPr>
           <a:lstStyle/>
           <a:p>
-            <a:pPr algn="ctr">
+            <a:pPr algn="l">
               <a:lnSpc>
-                <a:spcPts val="9458"/>
+                <a:spcPts val="2784"/>
               </a:lnSpc>
             </a:pPr>
             <a:r>
-              <a:rPr lang="en-US" sz="7759" spc="-147">
+              <a:rPr lang="en-US" sz="2263">
                 <a:solidFill>
-                  <a:srgbClr val="000000"/>
+                  <a:srgbClr val="FFFFFF"/>
                 </a:solidFill>
-                <a:latin typeface="Playfair Display SC"/>
-                <a:ea typeface="Playfair Display SC"/>
-                <a:cs typeface="Playfair Display SC"/>
-                <a:sym typeface="Playfair Display SC"/>
+                <a:latin typeface="Montserrat"/>
+                <a:ea typeface="Montserrat"/>
+                <a:cs typeface="Montserrat"/>
+                <a:sym typeface="Montserrat"/>
               </a:rPr>
-              <a:t>Educ</a:t>
-            </a:r>
-            <a:r>
-              <a:rPr lang="en-US" sz="7759" spc="-147">
-                <a:solidFill>
-                  <a:srgbClr val="000000"/>
-                </a:solidFill>
-                <a:latin typeface="Playfair Display SC"/>
-                <a:ea typeface="Playfair Display SC"/>
-                <a:cs typeface="Playfair Display SC"/>
-                <a:sym typeface="Playfair Display SC"/>
-              </a:rPr>
-              <a:t>ación</a:t>
-            </a:r>
-          </a:p>
-        </p:txBody>
-      </p:sp>
-      <p:sp>
-        <p:nvSpPr>
-          <p:cNvPr name="TextBox 13" id="13"/>
+              <a:t>{{contact_email}}</a:t>
+            </a:r>
+          </a:p>
+        </p:txBody>
+      </p:sp>
+      <p:sp>
+        <p:nvSpPr>
+          <p:cNvPr name="TextBox 28" id="28"/>
           <p:cNvSpPr txBox="true"/>
           <p:nvPr/>
         </p:nvSpPr>
         <p:spPr>
           <a:xfrm rot="0">
-            <a:off x="319545" y="8978177"/>
-            <a:ext cx="9389783" cy="699297"/>
+            <a:off x="16296932" y="10277742"/>
+            <a:ext cx="2808089" cy="353325"/>
           </a:xfrm>
           <a:prstGeom prst="rect">
             <a:avLst/>
@@ -3647,34 +4262,34 @@
           <a:p>
             <a:pPr algn="l">
               <a:lnSpc>
-                <a:spcPts val="5031"/>
+                <a:spcPts val="2784"/>
               </a:lnSpc>
             </a:pPr>
             <a:r>
-              <a:rPr lang="en-US" sz="3593">
+              <a:rPr lang="en-US" sz="2263">
                 <a:solidFill>
-                  <a:srgbClr val="000000"/>
+                  <a:srgbClr val="FFFFFF"/>
                 </a:solidFill>
-                <a:latin typeface="Calibri (MS)"/>
-                <a:ea typeface="Calibri (MS)"/>
-                <a:cs typeface="Calibri (MS)"/>
-                <a:sym typeface="Calibri (MS)"/>
+                <a:latin typeface="Montserrat"/>
+                <a:ea typeface="Montserrat"/>
+                <a:cs typeface="Montserrat"/>
+                <a:sym typeface="Montserrat"/>
               </a:rPr>
-              <a:t>{{about}}</a:t>
-            </a:r>
-          </a:p>
-        </p:txBody>
-      </p:sp>
-      <p:sp>
-        <p:nvSpPr>
-          <p:cNvPr name="TextBox 14" id="14"/>
+              <a:t>+ {{contact_phone}}</a:t>
+            </a:r>
+          </a:p>
+        </p:txBody>
+      </p:sp>
+      <p:sp>
+        <p:nvSpPr>
+          <p:cNvPr name="TextBox 29" id="29"/>
           <p:cNvSpPr txBox="true"/>
           <p:nvPr/>
         </p:nvSpPr>
         <p:spPr>
           <a:xfrm rot="0">
-            <a:off x="478505" y="19428520"/>
-            <a:ext cx="9389783" cy="2252782"/>
+            <a:off x="16286157" y="11240667"/>
+            <a:ext cx="3908919" cy="353325"/>
           </a:xfrm>
           <a:prstGeom prst="rect">
             <a:avLst/>
@@ -3686,101 +4301,36 @@
           </a:bodyPr>
           <a:lstStyle/>
           <a:p>
-            <a:pPr algn="l" marL="1545438" indent="-515146" lvl="2">
+            <a:pPr algn="l">
               <a:lnSpc>
-                <a:spcPts val="4288"/>
+                <a:spcPts val="2784"/>
               </a:lnSpc>
-              <a:buFont typeface="Arial"/>
-              <a:buChar char="⚬"/>
             </a:pPr>
             <a:r>
-              <a:rPr lang="en-US" sz="3793">
+              <a:rPr lang="en-US" sz="2263">
                 <a:solidFill>
-                  <a:srgbClr val="000000"/>
+                  <a:srgbClr val="FFFFFF"/>
                 </a:solidFill>
-                <a:latin typeface="Calibri (MS)"/>
-                <a:ea typeface="Calibri (MS)"/>
-                <a:cs typeface="Calibri (MS)"/>
-                <a:sym typeface="Calibri (MS)"/>
-              </a:rPr>
-              <a:t>{{contact_email}}</a:t>
-            </a:r>
-          </a:p>
-          <a:p>
-            <a:pPr algn="l" marL="1545438" indent="-515146" lvl="2">
-              <a:lnSpc>
-                <a:spcPts val="4288"/>
-              </a:lnSpc>
-              <a:buFont typeface="Arial"/>
-              <a:buChar char="⚬"/>
-            </a:pPr>
-            <a:r>
-              <a:rPr lang="en-US" sz="3793">
-                <a:solidFill>
-                  <a:srgbClr val="000000"/>
-                </a:solidFill>
-                <a:latin typeface="Calibri (MS)"/>
-                <a:ea typeface="Calibri (MS)"/>
-                <a:cs typeface="Calibri (MS)"/>
-                <a:sym typeface="Calibri (MS)"/>
+                <a:latin typeface="Montserrat"/>
+                <a:ea typeface="Montserrat"/>
+                <a:cs typeface="Montserrat"/>
+                <a:sym typeface="Montserrat"/>
               </a:rPr>
               <a:t>{{contact_location}}</a:t>
             </a:r>
           </a:p>
-          <a:p>
-            <a:pPr algn="l" marL="1545438" indent="-515146" lvl="2">
-              <a:lnSpc>
-                <a:spcPts val="4288"/>
-              </a:lnSpc>
-              <a:buFont typeface="Arial"/>
-              <a:buChar char="⚬"/>
-            </a:pPr>
-            <a:r>
-              <a:rPr lang="en-US" sz="3793">
-                <a:solidFill>
-                  <a:srgbClr val="000000"/>
-                </a:solidFill>
-                <a:latin typeface="Calibri (MS)"/>
-                <a:ea typeface="Calibri (MS)"/>
-                <a:cs typeface="Calibri (MS)"/>
-                <a:sym typeface="Calibri (MS)"/>
-              </a:rPr>
-              <a:t>{{contact_website}}</a:t>
-            </a:r>
-          </a:p>
-          <a:p>
-            <a:pPr algn="l" marL="1545438" indent="-515146" lvl="2">
-              <a:lnSpc>
-                <a:spcPts val="4288"/>
-              </a:lnSpc>
-              <a:buFont typeface="Arial"/>
-              <a:buChar char="⚬"/>
-            </a:pPr>
-            <a:r>
-              <a:rPr lang="en-US" sz="3793">
-                <a:solidFill>
-                  <a:srgbClr val="000000"/>
-                </a:solidFill>
-                <a:latin typeface="Calibri (MS)"/>
-                <a:ea typeface="Calibri (MS)"/>
-                <a:cs typeface="Calibri (MS)"/>
-                <a:sym typeface="Calibri (MS)"/>
-              </a:rPr>
-              <a:t>{{exp_1_company}}</a:t>
-            </a:r>
-          </a:p>
-        </p:txBody>
-      </p:sp>
-      <p:sp>
-        <p:nvSpPr>
-          <p:cNvPr name="TextBox 15" id="15"/>
+        </p:txBody>
+      </p:sp>
+      <p:sp>
+        <p:nvSpPr>
+          <p:cNvPr name="TextBox 30" id="30"/>
           <p:cNvSpPr txBox="true"/>
           <p:nvPr/>
         </p:nvSpPr>
         <p:spPr>
           <a:xfrm rot="0">
-            <a:off x="915727" y="24934981"/>
-            <a:ext cx="7683015" cy="543243"/>
+            <a:off x="15244896" y="6726555"/>
+            <a:ext cx="5086064" cy="613829"/>
           </a:xfrm>
           <a:prstGeom prst="rect">
             <a:avLst/>
@@ -3794,296 +4344,1590 @@
           <a:p>
             <a:pPr algn="l">
               <a:lnSpc>
-                <a:spcPts val="4374"/>
+                <a:spcPts val="4751"/>
               </a:lnSpc>
             </a:pPr>
             <a:r>
-              <a:rPr lang="en-US" sz="2897">
+              <a:rPr lang="en-US" sz="3395" b="true">
                 <a:solidFill>
-                  <a:srgbClr val="202021"/>
+                  <a:srgbClr val="FFFFFF"/>
                 </a:solidFill>
-                <a:latin typeface="Poppins"/>
-                <a:ea typeface="Poppins"/>
-                <a:cs typeface="Poppins"/>
-                <a:sym typeface="Poppins"/>
-              </a:rPr>
-              <a:t>{{</a:t>
-            </a:r>
-            <a:r>
-              <a:rPr lang="en-US" sz="2897">
-                <a:solidFill>
-                  <a:srgbClr val="202021"/>
-                </a:solidFill>
-                <a:latin typeface="Poppins"/>
-                <a:ea typeface="Poppins"/>
-                <a:cs typeface="Poppins"/>
-                <a:sym typeface="Poppins"/>
-              </a:rPr>
-              <a:t>edu_1_school}}</a:t>
-            </a:r>
-          </a:p>
-        </p:txBody>
-      </p:sp>
-      <p:sp>
-        <p:nvSpPr>
-          <p:cNvPr name="TextBox 16" id="16"/>
-          <p:cNvSpPr txBox="true"/>
-          <p:nvPr/>
-        </p:nvSpPr>
-        <p:spPr>
-          <a:xfrm rot="0">
-            <a:off x="885742" y="25927626"/>
-            <a:ext cx="6965375" cy="536991"/>
-          </a:xfrm>
-          <a:prstGeom prst="rect">
-            <a:avLst/>
-          </a:prstGeom>
-        </p:spPr>
-        <p:txBody>
-          <a:bodyPr anchor="t" rtlCol="false" tIns="0" lIns="0" bIns="0" rIns="0">
-            <a:spAutoFit/>
-          </a:bodyPr>
-          <a:lstStyle/>
-          <a:p>
-            <a:pPr algn="l">
-              <a:lnSpc>
-                <a:spcPts val="4249"/>
-              </a:lnSpc>
-            </a:pPr>
-            <a:r>
-              <a:rPr lang="en-US" sz="2814" i="true">
-                <a:solidFill>
-                  <a:srgbClr val="202021"/>
-                </a:solidFill>
-                <a:latin typeface="Poppins Italics"/>
-                <a:ea typeface="Poppins Italics"/>
-                <a:cs typeface="Poppins Italics"/>
-                <a:sym typeface="Poppins Italics"/>
-              </a:rPr>
-              <a:t>{{ed</a:t>
-            </a:r>
-            <a:r>
-              <a:rPr lang="en-US" sz="2814" i="true">
-                <a:solidFill>
-                  <a:srgbClr val="202021"/>
-                </a:solidFill>
-                <a:latin typeface="Poppins Italics"/>
-                <a:ea typeface="Poppins Italics"/>
-                <a:cs typeface="Poppins Italics"/>
-                <a:sym typeface="Poppins Italics"/>
-              </a:rPr>
-              <a:t>u_1_degree}}</a:t>
-            </a:r>
-          </a:p>
-        </p:txBody>
-      </p:sp>
-      <p:sp>
-        <p:nvSpPr>
-          <p:cNvPr name="TextBox 17" id="17"/>
-          <p:cNvSpPr txBox="true"/>
-          <p:nvPr/>
-        </p:nvSpPr>
-        <p:spPr>
-          <a:xfrm rot="0">
-            <a:off x="10417816" y="26129447"/>
-            <a:ext cx="8835876" cy="1305173"/>
-          </a:xfrm>
-          <a:prstGeom prst="rect">
-            <a:avLst/>
-          </a:prstGeom>
-        </p:spPr>
-        <p:txBody>
-          <a:bodyPr anchor="t" rtlCol="false" tIns="0" lIns="0" bIns="0" rIns="0">
-            <a:spAutoFit/>
-          </a:bodyPr>
-          <a:lstStyle/>
-          <a:p>
-            <a:pPr algn="l">
-              <a:lnSpc>
-                <a:spcPts val="4827"/>
-              </a:lnSpc>
-            </a:pPr>
-            <a:r>
-              <a:rPr lang="en-US" sz="3197" b="true">
-                <a:solidFill>
-                  <a:srgbClr val="202021"/>
-                </a:solidFill>
-                <a:latin typeface="Poppins Bold"/>
-                <a:ea typeface="Poppins Bold"/>
-                <a:cs typeface="Poppins Bold"/>
-                <a:sym typeface="Poppins Bold"/>
-              </a:rPr>
-              <a:t>Curso de Marketing Digital y Redes Sociales</a:t>
-            </a:r>
-          </a:p>
-        </p:txBody>
-      </p:sp>
-      <p:sp>
-        <p:nvSpPr>
-          <p:cNvPr name="TextBox 18" id="18"/>
-          <p:cNvSpPr txBox="true"/>
-          <p:nvPr/>
-        </p:nvSpPr>
-        <p:spPr>
-          <a:xfrm rot="0">
-            <a:off x="10417816" y="27476806"/>
-            <a:ext cx="8835876" cy="639699"/>
-          </a:xfrm>
-          <a:prstGeom prst="rect">
-            <a:avLst/>
-          </a:prstGeom>
-        </p:spPr>
-        <p:txBody>
-          <a:bodyPr anchor="t" rtlCol="false" tIns="0" lIns="0" bIns="0" rIns="0">
-            <a:spAutoFit/>
-          </a:bodyPr>
-          <a:lstStyle/>
-          <a:p>
-            <a:pPr algn="l">
-              <a:lnSpc>
-                <a:spcPts val="4400"/>
-              </a:lnSpc>
-            </a:pPr>
-            <a:r>
-              <a:rPr lang="en-US" sz="2914">
-                <a:solidFill>
-                  <a:srgbClr val="202021"/>
-                </a:solidFill>
-                <a:latin typeface="Poppins"/>
-                <a:ea typeface="Poppins"/>
-                <a:cs typeface="Poppins"/>
-                <a:sym typeface="Poppins"/>
-              </a:rPr>
-              <a:t>Alta Pinta, 2018</a:t>
-            </a:r>
-          </a:p>
-        </p:txBody>
-      </p:sp>
-      <p:sp>
-        <p:nvSpPr>
-          <p:cNvPr name="TextBox 19" id="19"/>
-          <p:cNvSpPr txBox="true"/>
-          <p:nvPr/>
-        </p:nvSpPr>
-        <p:spPr>
-          <a:xfrm rot="0">
-            <a:off x="2375432" y="17325923"/>
-            <a:ext cx="5137947" cy="1153976"/>
-          </a:xfrm>
-          <a:prstGeom prst="rect">
-            <a:avLst/>
-          </a:prstGeom>
-        </p:spPr>
-        <p:txBody>
-          <a:bodyPr anchor="t" rtlCol="false" tIns="0" lIns="0" bIns="0" rIns="0">
-            <a:spAutoFit/>
-          </a:bodyPr>
-          <a:lstStyle/>
-          <a:p>
-            <a:pPr algn="ctr">
-              <a:lnSpc>
-                <a:spcPts val="9241"/>
-              </a:lnSpc>
-            </a:pPr>
-            <a:r>
-              <a:rPr lang="en-US" sz="7582">
-                <a:solidFill>
-                  <a:srgbClr val="000000"/>
-                </a:solidFill>
-                <a:latin typeface="Playfair Display SC"/>
-                <a:ea typeface="Playfair Display SC"/>
-                <a:cs typeface="Playfair Display SC"/>
-                <a:sym typeface="Playfair Display SC"/>
+                <a:latin typeface="Montserrat Bold"/>
+                <a:ea typeface="Montserrat Bold"/>
+                <a:cs typeface="Montserrat Bold"/>
+                <a:sym typeface="Montserrat Bold"/>
               </a:rPr>
               <a:t>Contacto</a:t>
             </a:r>
           </a:p>
         </p:txBody>
       </p:sp>
-      <p:sp>
-        <p:nvSpPr>
-          <p:cNvPr name="TextBox 20" id="20"/>
-          <p:cNvSpPr txBox="true"/>
-          <p:nvPr/>
-        </p:nvSpPr>
-        <p:spPr>
-          <a:xfrm rot="0">
-            <a:off x="10912058" y="24782812"/>
-            <a:ext cx="8357295" cy="1492725"/>
-          </a:xfrm>
-          <a:prstGeom prst="rect">
-            <a:avLst/>
-          </a:prstGeom>
-        </p:spPr>
-        <p:txBody>
-          <a:bodyPr anchor="t" rtlCol="false" tIns="0" lIns="0" bIns="0" rIns="0">
-            <a:spAutoFit/>
-          </a:bodyPr>
-          <a:lstStyle/>
-          <a:p>
-            <a:pPr algn="ctr">
-              <a:lnSpc>
-                <a:spcPts val="5908"/>
-              </a:lnSpc>
-            </a:pPr>
-            <a:r>
-              <a:rPr lang="en-US" sz="5093" spc="-96">
-                <a:solidFill>
-                  <a:srgbClr val="000000"/>
-                </a:solidFill>
-                <a:latin typeface="Playfair Display SC"/>
-                <a:ea typeface="Playfair Display SC"/>
-                <a:cs typeface="Playfair Display SC"/>
-                <a:sym typeface="Playfair Display SC"/>
-              </a:rPr>
-              <a:t>Cur</a:t>
-            </a:r>
-            <a:r>
-              <a:rPr lang="en-US" sz="5093" spc="-96">
-                <a:solidFill>
-                  <a:srgbClr val="000000"/>
-                </a:solidFill>
-                <a:latin typeface="Playfair Display SC"/>
-                <a:ea typeface="Playfair Display SC"/>
-                <a:cs typeface="Playfair Display SC"/>
-                <a:sym typeface="Playfair Display SC"/>
-              </a:rPr>
-              <a:t>sos y Certificaciones</a:t>
-            </a:r>
-          </a:p>
-          <a:p>
-            <a:pPr algn="ctr">
-              <a:lnSpc>
-                <a:spcPts val="5908"/>
-              </a:lnSpc>
-            </a:pPr>
-          </a:p>
-        </p:txBody>
-      </p:sp>
       <p:grpSp>
         <p:nvGrpSpPr>
-          <p:cNvPr name="Group 21" id="21"/>
+          <p:cNvPr name="Group 31" id="31"/>
           <p:cNvGrpSpPr/>
           <p:nvPr/>
         </p:nvGrpSpPr>
         <p:grpSpPr>
           <a:xfrm rot="0">
-            <a:off x="9709328" y="2575993"/>
-            <a:ext cx="11444230" cy="2686274"/>
+            <a:off x="15217940" y="13490467"/>
+            <a:ext cx="5114011" cy="53912"/>
             <a:chOff x="0" y="0"/>
-            <a:chExt cx="15258974" cy="3581698"/>
+            <a:chExt cx="6818681" cy="71882"/>
           </a:xfrm>
         </p:grpSpPr>
         <p:sp>
           <p:nvSpPr>
-            <p:cNvPr name="TextBox 22" id="22"/>
+            <p:cNvPr name="Freeform 32" id="32"/>
+            <p:cNvSpPr/>
+            <p:nvPr/>
+          </p:nvSpPr>
+          <p:spPr>
+            <a:xfrm flipH="false" flipV="false" rot="0">
+              <a:off x="47879" y="0"/>
+              <a:ext cx="6746875" cy="95885"/>
+            </a:xfrm>
+            <a:custGeom>
+              <a:avLst/>
+              <a:gdLst/>
+              <a:ahLst/>
+              <a:cxnLst/>
+              <a:rect r="r" b="b" t="t" l="l"/>
+              <a:pathLst>
+                <a:path h="95885" w="6746875">
+                  <a:moveTo>
+                    <a:pt x="6746875" y="95885"/>
+                  </a:moveTo>
+                  <a:lnTo>
+                    <a:pt x="0" y="95885"/>
+                  </a:lnTo>
+                  <a:lnTo>
+                    <a:pt x="0" y="0"/>
+                  </a:lnTo>
+                  <a:lnTo>
+                    <a:pt x="6746875" y="0"/>
+                  </a:lnTo>
+                  <a:close/>
+                </a:path>
+              </a:pathLst>
+            </a:custGeom>
+            <a:solidFill>
+              <a:srgbClr val="FFFFFF"/>
+            </a:solidFill>
+            <a:ln w="12700">
+              <a:solidFill>
+                <a:srgbClr val="000000"/>
+              </a:solidFill>
+            </a:ln>
+          </p:spPr>
+        </p:sp>
+      </p:grpSp>
+      <p:sp>
+        <p:nvSpPr>
+          <p:cNvPr name="TextBox 33" id="33"/>
+          <p:cNvSpPr txBox="true"/>
+          <p:nvPr/>
+        </p:nvSpPr>
+        <p:spPr>
+          <a:xfrm rot="0">
+            <a:off x="15244896" y="12876752"/>
+            <a:ext cx="5086064" cy="613715"/>
+          </a:xfrm>
+          <a:prstGeom prst="rect">
+            <a:avLst/>
+          </a:prstGeom>
+        </p:spPr>
+        <p:txBody>
+          <a:bodyPr anchor="t" rtlCol="false" tIns="0" lIns="0" bIns="0" rIns="0">
+            <a:spAutoFit/>
+          </a:bodyPr>
+          <a:lstStyle/>
+          <a:p>
+            <a:pPr algn="l">
+              <a:lnSpc>
+                <a:spcPts val="4751"/>
+              </a:lnSpc>
+            </a:pPr>
+            <a:r>
+              <a:rPr lang="en-US" sz="3395" b="true">
+                <a:solidFill>
+                  <a:srgbClr val="FFFFFF"/>
+                </a:solidFill>
+                <a:latin typeface="Montserrat Bold"/>
+                <a:ea typeface="Montserrat Bold"/>
+                <a:cs typeface="Montserrat Bold"/>
+                <a:sym typeface="Montserrat Bold"/>
+              </a:rPr>
+              <a:t>Educación</a:t>
+            </a:r>
+          </a:p>
+        </p:txBody>
+      </p:sp>
+      <p:sp>
+        <p:nvSpPr>
+          <p:cNvPr name="TextBox 34" id="34"/>
+          <p:cNvSpPr txBox="true"/>
+          <p:nvPr/>
+        </p:nvSpPr>
+        <p:spPr>
+          <a:xfrm rot="0">
+            <a:off x="15244896" y="13772569"/>
+            <a:ext cx="5060109" cy="424759"/>
+          </a:xfrm>
+          <a:prstGeom prst="rect">
+            <a:avLst/>
+          </a:prstGeom>
+        </p:spPr>
+        <p:txBody>
+          <a:bodyPr anchor="t" rtlCol="false" tIns="0" lIns="0" bIns="0" rIns="0">
+            <a:spAutoFit/>
+          </a:bodyPr>
+          <a:lstStyle/>
+          <a:p>
+            <a:pPr algn="l">
+              <a:lnSpc>
+                <a:spcPts val="3527"/>
+              </a:lnSpc>
+            </a:pPr>
+            <a:r>
+              <a:rPr lang="en-US" sz="2163">
+                <a:solidFill>
+                  <a:srgbClr val="FFFFFF"/>
+                </a:solidFill>
+                <a:latin typeface="Montserrat"/>
+                <a:ea typeface="Montserrat"/>
+                <a:cs typeface="Montserrat"/>
+                <a:sym typeface="Montserrat"/>
+              </a:rPr>
+              <a:t>{{edu_1_degree}} | {{edu_1_school}}</a:t>
+            </a:r>
+          </a:p>
+        </p:txBody>
+      </p:sp>
+      <p:grpSp>
+        <p:nvGrpSpPr>
+          <p:cNvPr name="Group 35" id="35"/>
+          <p:cNvGrpSpPr/>
+          <p:nvPr/>
+        </p:nvGrpSpPr>
+        <p:grpSpPr>
+          <a:xfrm rot="0">
+            <a:off x="15095039" y="16761659"/>
+            <a:ext cx="5114011" cy="53912"/>
+            <a:chOff x="0" y="0"/>
+            <a:chExt cx="6818681" cy="71882"/>
+          </a:xfrm>
+        </p:grpSpPr>
+        <p:sp>
+          <p:nvSpPr>
+            <p:cNvPr name="Freeform 36" id="36"/>
+            <p:cNvSpPr/>
+            <p:nvPr/>
+          </p:nvSpPr>
+          <p:spPr>
+            <a:xfrm flipH="false" flipV="false" rot="0">
+              <a:off x="47879" y="0"/>
+              <a:ext cx="6746875" cy="95885"/>
+            </a:xfrm>
+            <a:custGeom>
+              <a:avLst/>
+              <a:gdLst/>
+              <a:ahLst/>
+              <a:cxnLst/>
+              <a:rect r="r" b="b" t="t" l="l"/>
+              <a:pathLst>
+                <a:path h="95885" w="6746875">
+                  <a:moveTo>
+                    <a:pt x="6746875" y="95885"/>
+                  </a:moveTo>
+                  <a:lnTo>
+                    <a:pt x="0" y="95885"/>
+                  </a:lnTo>
+                  <a:lnTo>
+                    <a:pt x="0" y="0"/>
+                  </a:lnTo>
+                  <a:lnTo>
+                    <a:pt x="6746875" y="0"/>
+                  </a:lnTo>
+                  <a:close/>
+                </a:path>
+              </a:pathLst>
+            </a:custGeom>
+            <a:solidFill>
+              <a:srgbClr val="FFFFFF"/>
+            </a:solidFill>
+            <a:ln w="12700">
+              <a:solidFill>
+                <a:srgbClr val="000000"/>
+              </a:solidFill>
+            </a:ln>
+          </p:spPr>
+        </p:sp>
+      </p:grpSp>
+      <p:sp>
+        <p:nvSpPr>
+          <p:cNvPr name="TextBox 37" id="37"/>
+          <p:cNvSpPr txBox="true"/>
+          <p:nvPr/>
+        </p:nvSpPr>
+        <p:spPr>
+          <a:xfrm rot="0">
+            <a:off x="15121995" y="16093928"/>
+            <a:ext cx="5086064" cy="613829"/>
+          </a:xfrm>
+          <a:prstGeom prst="rect">
+            <a:avLst/>
+          </a:prstGeom>
+        </p:spPr>
+        <p:txBody>
+          <a:bodyPr anchor="t" rtlCol="false" tIns="0" lIns="0" bIns="0" rIns="0">
+            <a:spAutoFit/>
+          </a:bodyPr>
+          <a:lstStyle/>
+          <a:p>
+            <a:pPr algn="l">
+              <a:lnSpc>
+                <a:spcPts val="4751"/>
+              </a:lnSpc>
+            </a:pPr>
+            <a:r>
+              <a:rPr lang="en-US" sz="3395" b="true">
+                <a:solidFill>
+                  <a:srgbClr val="FFFFFF"/>
+                </a:solidFill>
+                <a:latin typeface="Montserrat Bold"/>
+                <a:ea typeface="Montserrat Bold"/>
+                <a:cs typeface="Montserrat Bold"/>
+                <a:sym typeface="Montserrat Bold"/>
+              </a:rPr>
+              <a:t>Idiomas</a:t>
+            </a:r>
+          </a:p>
+        </p:txBody>
+      </p:sp>
+      <p:sp>
+        <p:nvSpPr>
+          <p:cNvPr name="TextBox 38" id="38"/>
+          <p:cNvSpPr txBox="true"/>
+          <p:nvPr/>
+        </p:nvSpPr>
+        <p:spPr>
+          <a:xfrm rot="0">
+            <a:off x="15121995" y="16887161"/>
+            <a:ext cx="5331876" cy="1366737"/>
+          </a:xfrm>
+          <a:prstGeom prst="rect">
+            <a:avLst/>
+          </a:prstGeom>
+        </p:spPr>
+        <p:txBody>
+          <a:bodyPr anchor="t" rtlCol="false" tIns="0" lIns="0" bIns="0" rIns="0">
+            <a:spAutoFit/>
+          </a:bodyPr>
+          <a:lstStyle/>
+          <a:p>
+            <a:pPr algn="l" marL="927325" indent="-309108" lvl="2">
+              <a:lnSpc>
+                <a:spcPts val="3714"/>
+              </a:lnSpc>
+              <a:buFont typeface="Arial"/>
+              <a:buChar char="⚬"/>
+            </a:pPr>
+            <a:r>
+              <a:rPr lang="en-US" sz="2063">
+                <a:solidFill>
+                  <a:srgbClr val="FFFFFF"/>
+                </a:solidFill>
+                <a:latin typeface="Montserrat"/>
+                <a:ea typeface="Montserrat"/>
+                <a:cs typeface="Montserrat"/>
+                <a:sym typeface="Montserrat"/>
+              </a:rPr>
+              <a:t>{{idioma_1}}</a:t>
+            </a:r>
+          </a:p>
+          <a:p>
+            <a:pPr algn="l" marL="927325" indent="-309108" lvl="2">
+              <a:lnSpc>
+                <a:spcPts val="3714"/>
+              </a:lnSpc>
+              <a:buFont typeface="Arial"/>
+              <a:buChar char="⚬"/>
+            </a:pPr>
+            <a:r>
+              <a:rPr lang="en-US" sz="2063">
+                <a:solidFill>
+                  <a:srgbClr val="FFFFFF"/>
+                </a:solidFill>
+                <a:latin typeface="Montserrat"/>
+                <a:ea typeface="Montserrat"/>
+                <a:cs typeface="Montserrat"/>
+                <a:sym typeface="Montserrat"/>
+              </a:rPr>
+              <a:t>{{idioma_2}}</a:t>
+            </a:r>
+          </a:p>
+          <a:p>
+            <a:pPr algn="l" marL="927399" indent="-309133" lvl="2">
+              <a:lnSpc>
+                <a:spcPts val="3714"/>
+              </a:lnSpc>
+              <a:buFont typeface="Arial"/>
+              <a:buChar char="⚬"/>
+            </a:pPr>
+            <a:r>
+              <a:rPr lang="en-US" sz="2063">
+                <a:solidFill>
+                  <a:srgbClr val="FFFFFF"/>
+                </a:solidFill>
+                <a:latin typeface="Montserrat"/>
+                <a:ea typeface="Montserrat"/>
+                <a:cs typeface="Montserrat"/>
+                <a:sym typeface="Montserrat"/>
+              </a:rPr>
+              <a:t>{{idioma_3}}</a:t>
+            </a:r>
+          </a:p>
+        </p:txBody>
+      </p:sp>
+      <p:grpSp>
+        <p:nvGrpSpPr>
+          <p:cNvPr name="Group 39" id="39"/>
+          <p:cNvGrpSpPr/>
+          <p:nvPr/>
+        </p:nvGrpSpPr>
+        <p:grpSpPr>
+          <a:xfrm rot="0">
+            <a:off x="15108022" y="19793902"/>
+            <a:ext cx="5114011" cy="53912"/>
+            <a:chOff x="0" y="0"/>
+            <a:chExt cx="6818681" cy="71882"/>
+          </a:xfrm>
+        </p:grpSpPr>
+        <p:sp>
+          <p:nvSpPr>
+            <p:cNvPr name="Freeform 40" id="40"/>
+            <p:cNvSpPr/>
+            <p:nvPr/>
+          </p:nvSpPr>
+          <p:spPr>
+            <a:xfrm flipH="false" flipV="false" rot="0">
+              <a:off x="47879" y="0"/>
+              <a:ext cx="6746875" cy="95885"/>
+            </a:xfrm>
+            <a:custGeom>
+              <a:avLst/>
+              <a:gdLst/>
+              <a:ahLst/>
+              <a:cxnLst/>
+              <a:rect r="r" b="b" t="t" l="l"/>
+              <a:pathLst>
+                <a:path h="95885" w="6746875">
+                  <a:moveTo>
+                    <a:pt x="6746875" y="95885"/>
+                  </a:moveTo>
+                  <a:lnTo>
+                    <a:pt x="0" y="95885"/>
+                  </a:lnTo>
+                  <a:lnTo>
+                    <a:pt x="0" y="0"/>
+                  </a:lnTo>
+                  <a:lnTo>
+                    <a:pt x="6746875" y="0"/>
+                  </a:lnTo>
+                  <a:close/>
+                </a:path>
+              </a:pathLst>
+            </a:custGeom>
+            <a:solidFill>
+              <a:srgbClr val="FFFFFF"/>
+            </a:solidFill>
+            <a:ln w="12700">
+              <a:solidFill>
+                <a:srgbClr val="000000"/>
+              </a:solidFill>
+            </a:ln>
+          </p:spPr>
+        </p:sp>
+      </p:grpSp>
+      <p:sp>
+        <p:nvSpPr>
+          <p:cNvPr name="TextBox 41" id="41"/>
+          <p:cNvSpPr txBox="true"/>
+          <p:nvPr/>
+        </p:nvSpPr>
+        <p:spPr>
+          <a:xfrm rot="0">
+            <a:off x="15189999" y="19122923"/>
+            <a:ext cx="5086064" cy="613829"/>
+          </a:xfrm>
+          <a:prstGeom prst="rect">
+            <a:avLst/>
+          </a:prstGeom>
+        </p:spPr>
+        <p:txBody>
+          <a:bodyPr anchor="t" rtlCol="false" tIns="0" lIns="0" bIns="0" rIns="0">
+            <a:spAutoFit/>
+          </a:bodyPr>
+          <a:lstStyle/>
+          <a:p>
+            <a:pPr algn="l">
+              <a:lnSpc>
+                <a:spcPts val="4751"/>
+              </a:lnSpc>
+            </a:pPr>
+            <a:r>
+              <a:rPr lang="en-US" sz="3395" b="true">
+                <a:solidFill>
+                  <a:srgbClr val="FFFFFF"/>
+                </a:solidFill>
+                <a:latin typeface="Montserrat Bold"/>
+                <a:ea typeface="Montserrat Bold"/>
+                <a:cs typeface="Montserrat Bold"/>
+                <a:sym typeface="Montserrat Bold"/>
+              </a:rPr>
+              <a:t>Informática</a:t>
+            </a:r>
+          </a:p>
+        </p:txBody>
+      </p:sp>
+      <p:sp>
+        <p:nvSpPr>
+          <p:cNvPr name="TextBox 42" id="42"/>
+          <p:cNvSpPr txBox="true"/>
+          <p:nvPr/>
+        </p:nvSpPr>
+        <p:spPr>
+          <a:xfrm rot="0">
+            <a:off x="15147950" y="20212802"/>
+            <a:ext cx="5047126" cy="1722040"/>
+          </a:xfrm>
+          <a:prstGeom prst="rect">
+            <a:avLst/>
+          </a:prstGeom>
+        </p:spPr>
+        <p:txBody>
+          <a:bodyPr anchor="t" rtlCol="false" tIns="0" lIns="0" bIns="0" rIns="0">
+            <a:spAutoFit/>
+          </a:bodyPr>
+          <a:lstStyle/>
+          <a:p>
+            <a:pPr algn="l" marL="927399" indent="-309133" lvl="2">
+              <a:lnSpc>
+                <a:spcPts val="3467"/>
+              </a:lnSpc>
+              <a:buFont typeface="Arial"/>
+              <a:buChar char="⚬"/>
+            </a:pPr>
+            <a:r>
+              <a:rPr lang="en-US" sz="2063">
+                <a:solidFill>
+                  <a:srgbClr val="FFFFFF"/>
+                </a:solidFill>
+                <a:latin typeface="Montserrat"/>
+                <a:ea typeface="Montserrat"/>
+                <a:cs typeface="Montserrat"/>
+                <a:sym typeface="Montserrat"/>
+              </a:rPr>
+              <a:t>{{it_1}}</a:t>
+            </a:r>
+          </a:p>
+          <a:p>
+            <a:pPr algn="l" marL="927325" indent="-309108" lvl="2">
+              <a:lnSpc>
+                <a:spcPts val="3467"/>
+              </a:lnSpc>
+              <a:buFont typeface="Arial"/>
+              <a:buChar char="⚬"/>
+            </a:pPr>
+            <a:r>
+              <a:rPr lang="en-US" sz="2063">
+                <a:solidFill>
+                  <a:srgbClr val="FFFFFF"/>
+                </a:solidFill>
+                <a:latin typeface="Montserrat"/>
+                <a:ea typeface="Montserrat"/>
+                <a:cs typeface="Montserrat"/>
+                <a:sym typeface="Montserrat"/>
+              </a:rPr>
+              <a:t>{{it_2}}</a:t>
+            </a:r>
+          </a:p>
+          <a:p>
+            <a:pPr algn="l" marL="927325" indent="-309108" lvl="2">
+              <a:lnSpc>
+                <a:spcPts val="3467"/>
+              </a:lnSpc>
+              <a:buFont typeface="Arial"/>
+              <a:buChar char="⚬"/>
+            </a:pPr>
+            <a:r>
+              <a:rPr lang="en-US" sz="2063">
+                <a:solidFill>
+                  <a:srgbClr val="FFFFFF"/>
+                </a:solidFill>
+                <a:latin typeface="Montserrat"/>
+                <a:ea typeface="Montserrat"/>
+                <a:cs typeface="Montserrat"/>
+                <a:sym typeface="Montserrat"/>
+              </a:rPr>
+              <a:t>{{it_3}}</a:t>
+            </a:r>
+          </a:p>
+          <a:p>
+            <a:pPr algn="l" marL="927399" indent="-309133" lvl="2">
+              <a:lnSpc>
+                <a:spcPts val="3467"/>
+              </a:lnSpc>
+              <a:buFont typeface="Arial"/>
+              <a:buChar char="⚬"/>
+            </a:pPr>
+            <a:r>
+              <a:rPr lang="en-US" sz="2063">
+                <a:solidFill>
+                  <a:srgbClr val="FFFFFF"/>
+                </a:solidFill>
+                <a:latin typeface="Montserrat"/>
+                <a:ea typeface="Montserrat"/>
+                <a:cs typeface="Montserrat"/>
+                <a:sym typeface="Montserrat"/>
+              </a:rPr>
+              <a:t>{{it_4}}</a:t>
+            </a:r>
+          </a:p>
+        </p:txBody>
+      </p:sp>
+      <p:grpSp>
+        <p:nvGrpSpPr>
+          <p:cNvPr name="Group 43" id="43"/>
+          <p:cNvGrpSpPr/>
+          <p:nvPr/>
+        </p:nvGrpSpPr>
+        <p:grpSpPr>
+          <a:xfrm rot="0">
+            <a:off x="15067093" y="23739801"/>
+            <a:ext cx="5114011" cy="53912"/>
+            <a:chOff x="0" y="0"/>
+            <a:chExt cx="6818681" cy="71882"/>
+          </a:xfrm>
+        </p:grpSpPr>
+        <p:sp>
+          <p:nvSpPr>
+            <p:cNvPr name="Freeform 44" id="44"/>
+            <p:cNvSpPr/>
+            <p:nvPr/>
+          </p:nvSpPr>
+          <p:spPr>
+            <a:xfrm flipH="false" flipV="false" rot="0">
+              <a:off x="35941" y="0"/>
+              <a:ext cx="6746748" cy="71882"/>
+            </a:xfrm>
+            <a:custGeom>
+              <a:avLst/>
+              <a:gdLst/>
+              <a:ahLst/>
+              <a:cxnLst/>
+              <a:rect r="r" b="b" t="t" l="l"/>
+              <a:pathLst>
+                <a:path h="71882" w="6746748">
+                  <a:moveTo>
+                    <a:pt x="6746748" y="71882"/>
+                  </a:moveTo>
+                  <a:lnTo>
+                    <a:pt x="0" y="71882"/>
+                  </a:lnTo>
+                  <a:lnTo>
+                    <a:pt x="0" y="0"/>
+                  </a:lnTo>
+                  <a:lnTo>
+                    <a:pt x="6746748" y="0"/>
+                  </a:lnTo>
+                  <a:close/>
+                </a:path>
+              </a:pathLst>
+            </a:custGeom>
+            <a:solidFill>
+              <a:srgbClr val="FFFFFF"/>
+            </a:solidFill>
+            <a:ln w="12700">
+              <a:solidFill>
+                <a:srgbClr val="000000"/>
+              </a:solidFill>
+            </a:ln>
+          </p:spPr>
+        </p:sp>
+      </p:grpSp>
+      <p:sp>
+        <p:nvSpPr>
+          <p:cNvPr name="TextBox 45" id="45"/>
+          <p:cNvSpPr txBox="true"/>
+          <p:nvPr/>
+        </p:nvSpPr>
+        <p:spPr>
+          <a:xfrm rot="0">
+            <a:off x="15095039" y="23055344"/>
+            <a:ext cx="5086064" cy="627307"/>
+          </a:xfrm>
+          <a:prstGeom prst="rect">
+            <a:avLst/>
+          </a:prstGeom>
+        </p:spPr>
+        <p:txBody>
+          <a:bodyPr anchor="t" rtlCol="false" tIns="0" lIns="0" bIns="0" rIns="0">
+            <a:spAutoFit/>
+          </a:bodyPr>
+          <a:lstStyle/>
+          <a:p>
+            <a:pPr algn="l">
+              <a:lnSpc>
+                <a:spcPts val="4751"/>
+              </a:lnSpc>
+            </a:pPr>
+            <a:r>
+              <a:rPr lang="en-US" sz="3395" b="true">
+                <a:solidFill>
+                  <a:srgbClr val="FFFFFF"/>
+                </a:solidFill>
+                <a:latin typeface="Montserrat Bold"/>
+                <a:ea typeface="Montserrat Bold"/>
+                <a:cs typeface="Montserrat Bold"/>
+                <a:sym typeface="Montserrat Bold"/>
+              </a:rPr>
+              <a:t>Competencias</a:t>
+            </a:r>
+          </a:p>
+        </p:txBody>
+      </p:sp>
+      <p:sp>
+        <p:nvSpPr>
+          <p:cNvPr name="TextBox 46" id="46"/>
+          <p:cNvSpPr txBox="true"/>
+          <p:nvPr/>
+        </p:nvSpPr>
+        <p:spPr>
+          <a:xfrm rot="0">
+            <a:off x="15067093" y="23984213"/>
+            <a:ext cx="5331876" cy="2882323"/>
+          </a:xfrm>
+          <a:prstGeom prst="rect">
+            <a:avLst/>
+          </a:prstGeom>
+        </p:spPr>
+        <p:txBody>
+          <a:bodyPr anchor="t" rtlCol="false" tIns="0" lIns="0" bIns="0" rIns="0">
+            <a:spAutoFit/>
+          </a:bodyPr>
+          <a:lstStyle/>
+          <a:p>
+            <a:pPr algn="l" marL="1017188" indent="-339063" lvl="2">
+              <a:lnSpc>
+                <a:spcPts val="3871"/>
+              </a:lnSpc>
+              <a:buFont typeface="Arial"/>
+              <a:buChar char="⚬"/>
+            </a:pPr>
+            <a:r>
+              <a:rPr lang="en-US" sz="2263">
+                <a:solidFill>
+                  <a:srgbClr val="FFFFFF"/>
+                </a:solidFill>
+                <a:latin typeface="Montserrat"/>
+                <a:ea typeface="Montserrat"/>
+                <a:cs typeface="Montserrat"/>
+                <a:sym typeface="Montserrat"/>
+              </a:rPr>
+              <a:t>{{skill_1}}</a:t>
+            </a:r>
+          </a:p>
+          <a:p>
+            <a:pPr algn="l" marL="1017188" indent="-339063" lvl="2">
+              <a:lnSpc>
+                <a:spcPts val="3871"/>
+              </a:lnSpc>
+              <a:buFont typeface="Arial"/>
+              <a:buChar char="⚬"/>
+            </a:pPr>
+            <a:r>
+              <a:rPr lang="en-US" sz="2263">
+                <a:solidFill>
+                  <a:srgbClr val="FFFFFF"/>
+                </a:solidFill>
+                <a:latin typeface="Montserrat"/>
+                <a:ea typeface="Montserrat"/>
+                <a:cs typeface="Montserrat"/>
+                <a:sym typeface="Montserrat"/>
+              </a:rPr>
+              <a:t>{{skill_2}}</a:t>
+            </a:r>
+          </a:p>
+          <a:p>
+            <a:pPr algn="l" marL="1017188" indent="-339063" lvl="2">
+              <a:lnSpc>
+                <a:spcPts val="3871"/>
+              </a:lnSpc>
+              <a:buFont typeface="Arial"/>
+              <a:buChar char="⚬"/>
+            </a:pPr>
+            <a:r>
+              <a:rPr lang="en-US" sz="2263">
+                <a:solidFill>
+                  <a:srgbClr val="FFFFFF"/>
+                </a:solidFill>
+                <a:latin typeface="Montserrat"/>
+                <a:ea typeface="Montserrat"/>
+                <a:cs typeface="Montserrat"/>
+                <a:sym typeface="Montserrat"/>
+              </a:rPr>
+              <a:t>{{skill_3}}</a:t>
+            </a:r>
+          </a:p>
+          <a:p>
+            <a:pPr algn="l" marL="1017188" indent="-339063" lvl="2">
+              <a:lnSpc>
+                <a:spcPts val="3871"/>
+              </a:lnSpc>
+              <a:buFont typeface="Arial"/>
+              <a:buChar char="⚬"/>
+            </a:pPr>
+            <a:r>
+              <a:rPr lang="en-US" sz="2263">
+                <a:solidFill>
+                  <a:srgbClr val="FFFFFF"/>
+                </a:solidFill>
+                <a:latin typeface="Montserrat"/>
+                <a:ea typeface="Montserrat"/>
+                <a:cs typeface="Montserrat"/>
+                <a:sym typeface="Montserrat"/>
+              </a:rPr>
+              <a:t>{{skill_4}}</a:t>
+            </a:r>
+          </a:p>
+          <a:p>
+            <a:pPr algn="l" marL="1017188" indent="-339063" lvl="2">
+              <a:lnSpc>
+                <a:spcPts val="3871"/>
+              </a:lnSpc>
+              <a:buFont typeface="Arial"/>
+              <a:buChar char="⚬"/>
+            </a:pPr>
+            <a:r>
+              <a:rPr lang="en-US" sz="2263">
+                <a:solidFill>
+                  <a:srgbClr val="FFFFFF"/>
+                </a:solidFill>
+                <a:latin typeface="Montserrat"/>
+                <a:ea typeface="Montserrat"/>
+                <a:cs typeface="Montserrat"/>
+                <a:sym typeface="Montserrat"/>
+              </a:rPr>
+              <a:t>{{skill_5}}</a:t>
+            </a:r>
+          </a:p>
+          <a:p>
+            <a:pPr algn="l" marL="1017269" indent="-339090" lvl="2">
+              <a:lnSpc>
+                <a:spcPts val="3871"/>
+              </a:lnSpc>
+              <a:buFont typeface="Arial"/>
+              <a:buChar char="⚬"/>
+            </a:pPr>
+            <a:r>
+              <a:rPr lang="en-US" sz="2263">
+                <a:solidFill>
+                  <a:srgbClr val="FFFFFF"/>
+                </a:solidFill>
+                <a:latin typeface="Montserrat"/>
+                <a:ea typeface="Montserrat"/>
+                <a:cs typeface="Montserrat"/>
+                <a:sym typeface="Montserrat"/>
+              </a:rPr>
+              <a:t>{{skill_6}}</a:t>
+            </a:r>
+          </a:p>
+        </p:txBody>
+      </p:sp>
+      <p:sp>
+        <p:nvSpPr>
+          <p:cNvPr name="Freeform 47" id="47"/>
+          <p:cNvSpPr/>
+          <p:nvPr/>
+        </p:nvSpPr>
+        <p:spPr>
+          <a:xfrm flipH="false" flipV="false" rot="0">
+            <a:off x="1388340" y="26516208"/>
+            <a:ext cx="284433" cy="284433"/>
+          </a:xfrm>
+          <a:custGeom>
+            <a:avLst/>
+            <a:gdLst/>
+            <a:ahLst/>
+            <a:cxnLst/>
+            <a:rect r="r" b="b" t="t" l="l"/>
+            <a:pathLst>
+              <a:path h="284433" w="284433">
+                <a:moveTo>
+                  <a:pt x="0" y="0"/>
+                </a:moveTo>
+                <a:lnTo>
+                  <a:pt x="284433" y="0"/>
+                </a:lnTo>
+                <a:lnTo>
+                  <a:pt x="284433" y="284433"/>
+                </a:lnTo>
+                <a:lnTo>
+                  <a:pt x="0" y="284433"/>
+                </a:lnTo>
+                <a:lnTo>
+                  <a:pt x="0" y="0"/>
+                </a:lnTo>
+                <a:close/>
+              </a:path>
+            </a:pathLst>
+          </a:custGeom>
+          <a:blipFill>
+            <a:blip r:embed="rId4">
+              <a:extLst>
+                <a:ext uri="{96DAC541-7B7A-43D3-8B79-37D633B846F1}">
+                  <asvg:svgBlip xmlns:asvg="http://schemas.microsoft.com/office/drawing/2016/SVG/main" r:embed="rId5"/>
+                </a:ext>
+              </a:extLst>
+            </a:blip>
+            <a:stretch>
+              <a:fillRect l="0" t="0" r="0" b="0"/>
+            </a:stretch>
+          </a:blipFill>
+        </p:spPr>
+      </p:sp>
+      <p:sp>
+        <p:nvSpPr>
+          <p:cNvPr name="TextBox 48" id="48"/>
+          <p:cNvSpPr txBox="true"/>
+          <p:nvPr/>
+        </p:nvSpPr>
+        <p:spPr>
+          <a:xfrm rot="0">
+            <a:off x="2126590" y="10210600"/>
+            <a:ext cx="10857833" cy="5827173"/>
+          </a:xfrm>
+          <a:prstGeom prst="rect">
+            <a:avLst/>
+          </a:prstGeom>
+        </p:spPr>
+        <p:txBody>
+          <a:bodyPr anchor="t" rtlCol="false" tIns="0" lIns="0" bIns="0" rIns="0">
+            <a:spAutoFit/>
+          </a:bodyPr>
+          <a:lstStyle/>
+          <a:p>
+            <a:pPr algn="l">
+              <a:lnSpc>
+                <a:spcPts val="4233"/>
+              </a:lnSpc>
+            </a:pPr>
+          </a:p>
+          <a:p>
+            <a:pPr algn="l" marL="1017188" indent="-339063" lvl="2">
+              <a:lnSpc>
+                <a:spcPts val="4233"/>
+              </a:lnSpc>
+              <a:buFont typeface="Arial"/>
+              <a:buChar char="⚬"/>
+            </a:pPr>
+            <a:r>
+              <a:rPr lang="en-US" sz="2263">
+                <a:solidFill>
+                  <a:srgbClr val="000000"/>
+                </a:solidFill>
+                <a:latin typeface="Montserrat"/>
+                <a:ea typeface="Montserrat"/>
+                <a:cs typeface="Montserrat"/>
+                <a:sym typeface="Montserrat"/>
+              </a:rPr>
+              <a:t>{{exp_1_b1}}</a:t>
+            </a:r>
+          </a:p>
+          <a:p>
+            <a:pPr algn="l" marL="1017188" indent="-339063" lvl="2">
+              <a:lnSpc>
+                <a:spcPts val="4233"/>
+              </a:lnSpc>
+              <a:buFont typeface="Arial"/>
+              <a:buChar char="⚬"/>
+            </a:pPr>
+            <a:r>
+              <a:rPr lang="en-US" sz="2263">
+                <a:solidFill>
+                  <a:srgbClr val="000000"/>
+                </a:solidFill>
+                <a:latin typeface="Montserrat"/>
+                <a:ea typeface="Montserrat"/>
+                <a:cs typeface="Montserrat"/>
+                <a:sym typeface="Montserrat"/>
+              </a:rPr>
+              <a:t>{{exp_1_b2}}</a:t>
+            </a:r>
+          </a:p>
+          <a:p>
+            <a:pPr algn="l" marL="1017188" indent="-339063" lvl="2">
+              <a:lnSpc>
+                <a:spcPts val="4233"/>
+              </a:lnSpc>
+              <a:buFont typeface="Arial"/>
+              <a:buChar char="⚬"/>
+            </a:pPr>
+            <a:r>
+              <a:rPr lang="en-US" sz="2263">
+                <a:solidFill>
+                  <a:srgbClr val="000000"/>
+                </a:solidFill>
+                <a:latin typeface="Montserrat"/>
+                <a:ea typeface="Montserrat"/>
+                <a:cs typeface="Montserrat"/>
+                <a:sym typeface="Montserrat"/>
+              </a:rPr>
+              <a:t>{{exp_1_b3}}</a:t>
+            </a:r>
+          </a:p>
+          <a:p>
+            <a:pPr algn="l" marL="1017188" indent="-339063" lvl="2">
+              <a:lnSpc>
+                <a:spcPts val="4233"/>
+              </a:lnSpc>
+              <a:buFont typeface="Arial"/>
+              <a:buChar char="⚬"/>
+            </a:pPr>
+            <a:r>
+              <a:rPr lang="en-US" sz="2263">
+                <a:solidFill>
+                  <a:srgbClr val="000000"/>
+                </a:solidFill>
+                <a:latin typeface="Montserrat"/>
+                <a:ea typeface="Montserrat"/>
+                <a:cs typeface="Montserrat"/>
+                <a:sym typeface="Montserrat"/>
+              </a:rPr>
+              <a:t>{{exp_1_b4}}</a:t>
+            </a:r>
+          </a:p>
+          <a:p>
+            <a:pPr algn="l" marL="1017188" indent="-339063" lvl="2">
+              <a:lnSpc>
+                <a:spcPts val="4233"/>
+              </a:lnSpc>
+              <a:buFont typeface="Arial"/>
+              <a:buChar char="⚬"/>
+            </a:pPr>
+            <a:r>
+              <a:rPr lang="en-US" sz="2263">
+                <a:solidFill>
+                  <a:srgbClr val="000000"/>
+                </a:solidFill>
+                <a:latin typeface="Montserrat"/>
+                <a:ea typeface="Montserrat"/>
+                <a:cs typeface="Montserrat"/>
+                <a:sym typeface="Montserrat"/>
+              </a:rPr>
+              <a:t>{{exp_1_b5}}</a:t>
+            </a:r>
+          </a:p>
+          <a:p>
+            <a:pPr algn="l" marL="1017188" indent="-339063" lvl="2">
+              <a:lnSpc>
+                <a:spcPts val="4233"/>
+              </a:lnSpc>
+              <a:buFont typeface="Arial"/>
+              <a:buChar char="⚬"/>
+            </a:pPr>
+            <a:r>
+              <a:rPr lang="en-US" sz="2263">
+                <a:solidFill>
+                  <a:srgbClr val="000000"/>
+                </a:solidFill>
+                <a:latin typeface="Montserrat"/>
+                <a:ea typeface="Montserrat"/>
+                <a:cs typeface="Montserrat"/>
+                <a:sym typeface="Montserrat"/>
+              </a:rPr>
+              <a:t>{{exp_1_b6}}</a:t>
+            </a:r>
+          </a:p>
+          <a:p>
+            <a:pPr algn="l" marL="1017188" indent="-339063" lvl="2">
+              <a:lnSpc>
+                <a:spcPts val="4233"/>
+              </a:lnSpc>
+              <a:buFont typeface="Arial"/>
+              <a:buChar char="⚬"/>
+            </a:pPr>
+            <a:r>
+              <a:rPr lang="en-US" sz="2263">
+                <a:solidFill>
+                  <a:srgbClr val="000000"/>
+                </a:solidFill>
+                <a:latin typeface="Montserrat"/>
+                <a:ea typeface="Montserrat"/>
+                <a:cs typeface="Montserrat"/>
+                <a:sym typeface="Montserrat"/>
+              </a:rPr>
+              <a:t>{{exp_1_b7}}</a:t>
+            </a:r>
+          </a:p>
+          <a:p>
+            <a:pPr algn="l" marL="1017188" indent="-339063" lvl="2">
+              <a:lnSpc>
+                <a:spcPts val="4233"/>
+              </a:lnSpc>
+              <a:buFont typeface="Arial"/>
+              <a:buChar char="⚬"/>
+            </a:pPr>
+            <a:r>
+              <a:rPr lang="en-US" sz="2263">
+                <a:solidFill>
+                  <a:srgbClr val="000000"/>
+                </a:solidFill>
+                <a:latin typeface="Montserrat"/>
+                <a:ea typeface="Montserrat"/>
+                <a:cs typeface="Montserrat"/>
+                <a:sym typeface="Montserrat"/>
+              </a:rPr>
+              <a:t>{{exp_1_b8}}</a:t>
+            </a:r>
+          </a:p>
+          <a:p>
+            <a:pPr algn="l" marL="1017188" indent="-339063" lvl="2">
+              <a:lnSpc>
+                <a:spcPts val="4233"/>
+              </a:lnSpc>
+              <a:buFont typeface="Arial"/>
+              <a:buChar char="⚬"/>
+            </a:pPr>
+            <a:r>
+              <a:rPr lang="en-US" sz="2263">
+                <a:solidFill>
+                  <a:srgbClr val="000000"/>
+                </a:solidFill>
+                <a:latin typeface="Montserrat"/>
+                <a:ea typeface="Montserrat"/>
+                <a:cs typeface="Montserrat"/>
+                <a:sym typeface="Montserrat"/>
+              </a:rPr>
+              <a:t>{{exp_1_b9}}</a:t>
+            </a:r>
+          </a:p>
+          <a:p>
+            <a:pPr algn="l">
+              <a:lnSpc>
+                <a:spcPts val="4233"/>
+              </a:lnSpc>
+            </a:pPr>
+          </a:p>
+        </p:txBody>
+      </p:sp>
+      <p:sp>
+        <p:nvSpPr>
+          <p:cNvPr name="TextBox 49" id="49"/>
+          <p:cNvSpPr txBox="true"/>
+          <p:nvPr/>
+        </p:nvSpPr>
+        <p:spPr>
+          <a:xfrm rot="0">
+            <a:off x="2138400" y="9741888"/>
+            <a:ext cx="5073592" cy="381082"/>
+          </a:xfrm>
+          <a:prstGeom prst="rect">
+            <a:avLst/>
+          </a:prstGeom>
+        </p:spPr>
+        <p:txBody>
+          <a:bodyPr anchor="t" rtlCol="false" tIns="0" lIns="0" bIns="0" rIns="0">
+            <a:spAutoFit/>
+          </a:bodyPr>
+          <a:lstStyle/>
+          <a:p>
+            <a:pPr algn="l">
+              <a:lnSpc>
+                <a:spcPts val="3145"/>
+              </a:lnSpc>
+            </a:pPr>
+            <a:r>
+              <a:rPr lang="en-US" sz="2246" b="true">
+                <a:solidFill>
+                  <a:srgbClr val="2B554E"/>
+                </a:solidFill>
+                <a:latin typeface="Montserrat Bold"/>
+                <a:ea typeface="Montserrat Bold"/>
+                <a:cs typeface="Montserrat Bold"/>
+                <a:sym typeface="Montserrat Bold"/>
+              </a:rPr>
+              <a:t>{</a:t>
+            </a:r>
+            <a:r>
+              <a:rPr lang="en-US" sz="2246" b="true">
+                <a:solidFill>
+                  <a:srgbClr val="2B554E"/>
+                </a:solidFill>
+                <a:latin typeface="Montserrat Bold"/>
+                <a:ea typeface="Montserrat Bold"/>
+                <a:cs typeface="Montserrat Bold"/>
+                <a:sym typeface="Montserrat Bold"/>
+              </a:rPr>
+              <a:t>{exp_1_role}} </a:t>
+            </a:r>
+            <a:r>
+              <a:rPr lang="en-US" sz="2246">
+                <a:solidFill>
+                  <a:srgbClr val="000000"/>
+                </a:solidFill>
+                <a:latin typeface="Montserrat"/>
+                <a:ea typeface="Montserrat"/>
+                <a:cs typeface="Montserrat"/>
+                <a:sym typeface="Montserrat"/>
+              </a:rPr>
+              <a:t> </a:t>
+            </a:r>
+          </a:p>
+        </p:txBody>
+      </p:sp>
+      <p:sp>
+        <p:nvSpPr>
+          <p:cNvPr name="TextBox 50" id="50"/>
+          <p:cNvSpPr txBox="true"/>
+          <p:nvPr/>
+        </p:nvSpPr>
+        <p:spPr>
+          <a:xfrm rot="0">
+            <a:off x="7164038" y="9733891"/>
+            <a:ext cx="3076426" cy="381082"/>
+          </a:xfrm>
+          <a:prstGeom prst="rect">
+            <a:avLst/>
+          </a:prstGeom>
+        </p:spPr>
+        <p:txBody>
+          <a:bodyPr anchor="t" rtlCol="false" tIns="0" lIns="0" bIns="0" rIns="0">
+            <a:spAutoFit/>
+          </a:bodyPr>
+          <a:lstStyle/>
+          <a:p>
+            <a:pPr algn="l">
+              <a:lnSpc>
+                <a:spcPts val="3145"/>
+              </a:lnSpc>
+            </a:pPr>
+            <a:r>
+              <a:rPr lang="en-US" sz="2246">
+                <a:solidFill>
+                  <a:srgbClr val="000000"/>
+                </a:solidFill>
+                <a:latin typeface="Montserrat"/>
+                <a:ea typeface="Montserrat"/>
+                <a:cs typeface="Montserrat"/>
+                <a:sym typeface="Montserrat"/>
+              </a:rPr>
+              <a:t> {{exp_1_company}}</a:t>
+            </a:r>
+          </a:p>
+        </p:txBody>
+      </p:sp>
+      <p:sp>
+        <p:nvSpPr>
+          <p:cNvPr name="TextBox 51" id="51"/>
+          <p:cNvSpPr txBox="true"/>
+          <p:nvPr/>
+        </p:nvSpPr>
+        <p:spPr>
+          <a:xfrm rot="0">
+            <a:off x="10386854" y="9743037"/>
+            <a:ext cx="2377976" cy="353325"/>
+          </a:xfrm>
+          <a:prstGeom prst="rect">
+            <a:avLst/>
+          </a:prstGeom>
+        </p:spPr>
+        <p:txBody>
+          <a:bodyPr anchor="t" rtlCol="false" tIns="0" lIns="0" bIns="0" rIns="0">
+            <a:spAutoFit/>
+          </a:bodyPr>
+          <a:lstStyle/>
+          <a:p>
+            <a:pPr algn="ctr">
+              <a:lnSpc>
+                <a:spcPts val="2784"/>
+              </a:lnSpc>
+              <a:spcBef>
+                <a:spcPct val="0"/>
+              </a:spcBef>
+            </a:pPr>
+            <a:r>
+              <a:rPr lang="en-US" sz="2263">
+                <a:solidFill>
+                  <a:srgbClr val="000000"/>
+                </a:solidFill>
+                <a:latin typeface="Montserrat"/>
+                <a:ea typeface="Montserrat"/>
+                <a:cs typeface="Montserrat"/>
+                <a:sym typeface="Montserrat"/>
+              </a:rPr>
+              <a:t>– {{exp_1_dates}}</a:t>
+            </a:r>
+          </a:p>
+        </p:txBody>
+      </p:sp>
+      <p:grpSp>
+        <p:nvGrpSpPr>
+          <p:cNvPr name="Group 52" id="52"/>
+          <p:cNvGrpSpPr/>
+          <p:nvPr/>
+        </p:nvGrpSpPr>
+        <p:grpSpPr>
+          <a:xfrm rot="0">
+            <a:off x="2126110" y="22227110"/>
+            <a:ext cx="10858312" cy="6286359"/>
+            <a:chOff x="0" y="0"/>
+            <a:chExt cx="14477750" cy="8381812"/>
+          </a:xfrm>
+        </p:grpSpPr>
+        <p:sp>
+          <p:nvSpPr>
+            <p:cNvPr name="TextBox 53" id="53"/>
             <p:cNvSpPr txBox="true"/>
             <p:nvPr/>
           </p:nvSpPr>
           <p:spPr>
             <a:xfrm rot="0">
-              <a:off x="0" y="-457200"/>
-              <a:ext cx="15258974" cy="2200066"/>
+              <a:off x="0" y="663049"/>
+              <a:ext cx="14477111" cy="7718763"/>
+            </a:xfrm>
+            <a:prstGeom prst="rect">
+              <a:avLst/>
+            </a:prstGeom>
+          </p:spPr>
+          <p:txBody>
+            <a:bodyPr anchor="t" rtlCol="false" tIns="0" lIns="0" bIns="0" rIns="0">
+              <a:spAutoFit/>
+            </a:bodyPr>
+            <a:lstStyle/>
+            <a:p>
+              <a:pPr algn="l">
+                <a:lnSpc>
+                  <a:spcPts val="4233"/>
+                </a:lnSpc>
+              </a:pPr>
+            </a:p>
+            <a:p>
+              <a:pPr algn="l" marL="1017188" indent="-339063" lvl="2">
+                <a:lnSpc>
+                  <a:spcPts val="4233"/>
+                </a:lnSpc>
+                <a:buFont typeface="Arial"/>
+                <a:buChar char="⚬"/>
+              </a:pPr>
+              <a:r>
+                <a:rPr lang="en-US" sz="2263">
+                  <a:solidFill>
+                    <a:srgbClr val="000000"/>
+                  </a:solidFill>
+                  <a:latin typeface="Montserrat"/>
+                  <a:ea typeface="Montserrat"/>
+                  <a:cs typeface="Montserrat"/>
+                  <a:sym typeface="Montserrat"/>
+                </a:rPr>
+                <a:t>{{exp_3_b1}}</a:t>
+              </a:r>
+            </a:p>
+            <a:p>
+              <a:pPr algn="l" marL="1017188" indent="-339063" lvl="2">
+                <a:lnSpc>
+                  <a:spcPts val="4233"/>
+                </a:lnSpc>
+                <a:buFont typeface="Arial"/>
+                <a:buChar char="⚬"/>
+              </a:pPr>
+              <a:r>
+                <a:rPr lang="en-US" sz="2263">
+                  <a:solidFill>
+                    <a:srgbClr val="000000"/>
+                  </a:solidFill>
+                  <a:latin typeface="Montserrat"/>
+                  <a:ea typeface="Montserrat"/>
+                  <a:cs typeface="Montserrat"/>
+                  <a:sym typeface="Montserrat"/>
+                </a:rPr>
+                <a:t>{{exp_3_b2}}</a:t>
+              </a:r>
+            </a:p>
+            <a:p>
+              <a:pPr algn="l" marL="1017188" indent="-339063" lvl="2">
+                <a:lnSpc>
+                  <a:spcPts val="4233"/>
+                </a:lnSpc>
+                <a:buFont typeface="Arial"/>
+                <a:buChar char="⚬"/>
+              </a:pPr>
+              <a:r>
+                <a:rPr lang="en-US" sz="2263">
+                  <a:solidFill>
+                    <a:srgbClr val="000000"/>
+                  </a:solidFill>
+                  <a:latin typeface="Montserrat"/>
+                  <a:ea typeface="Montserrat"/>
+                  <a:cs typeface="Montserrat"/>
+                  <a:sym typeface="Montserrat"/>
+                </a:rPr>
+                <a:t>{{exp_3_b3}}</a:t>
+              </a:r>
+            </a:p>
+            <a:p>
+              <a:pPr algn="l" marL="1017188" indent="-339063" lvl="2">
+                <a:lnSpc>
+                  <a:spcPts val="4233"/>
+                </a:lnSpc>
+                <a:buFont typeface="Arial"/>
+                <a:buChar char="⚬"/>
+              </a:pPr>
+              <a:r>
+                <a:rPr lang="en-US" sz="2263">
+                  <a:solidFill>
+                    <a:srgbClr val="000000"/>
+                  </a:solidFill>
+                  <a:latin typeface="Montserrat"/>
+                  <a:ea typeface="Montserrat"/>
+                  <a:cs typeface="Montserrat"/>
+                  <a:sym typeface="Montserrat"/>
+                </a:rPr>
+                <a:t>{{exp_3_b4}}</a:t>
+              </a:r>
+            </a:p>
+            <a:p>
+              <a:pPr algn="l" marL="1017188" indent="-339063" lvl="2">
+                <a:lnSpc>
+                  <a:spcPts val="4233"/>
+                </a:lnSpc>
+                <a:buFont typeface="Arial"/>
+                <a:buChar char="⚬"/>
+              </a:pPr>
+              <a:r>
+                <a:rPr lang="en-US" sz="2263">
+                  <a:solidFill>
+                    <a:srgbClr val="000000"/>
+                  </a:solidFill>
+                  <a:latin typeface="Montserrat"/>
+                  <a:ea typeface="Montserrat"/>
+                  <a:cs typeface="Montserrat"/>
+                  <a:sym typeface="Montserrat"/>
+                </a:rPr>
+                <a:t>{{exp_3_b5}}</a:t>
+              </a:r>
+            </a:p>
+            <a:p>
+              <a:pPr algn="l" marL="1017188" indent="-339063" lvl="2">
+                <a:lnSpc>
+                  <a:spcPts val="4233"/>
+                </a:lnSpc>
+                <a:buFont typeface="Arial"/>
+                <a:buChar char="⚬"/>
+              </a:pPr>
+              <a:r>
+                <a:rPr lang="en-US" sz="2263">
+                  <a:solidFill>
+                    <a:srgbClr val="000000"/>
+                  </a:solidFill>
+                  <a:latin typeface="Montserrat"/>
+                  <a:ea typeface="Montserrat"/>
+                  <a:cs typeface="Montserrat"/>
+                  <a:sym typeface="Montserrat"/>
+                </a:rPr>
+                <a:t>{{exp_3_b6}}</a:t>
+              </a:r>
+            </a:p>
+            <a:p>
+              <a:pPr algn="l" marL="1017188" indent="-339063" lvl="2">
+                <a:lnSpc>
+                  <a:spcPts val="4233"/>
+                </a:lnSpc>
+                <a:buFont typeface="Arial"/>
+                <a:buChar char="⚬"/>
+              </a:pPr>
+              <a:r>
+                <a:rPr lang="en-US" sz="2263">
+                  <a:solidFill>
+                    <a:srgbClr val="000000"/>
+                  </a:solidFill>
+                  <a:latin typeface="Montserrat"/>
+                  <a:ea typeface="Montserrat"/>
+                  <a:cs typeface="Montserrat"/>
+                  <a:sym typeface="Montserrat"/>
+                </a:rPr>
+                <a:t>{{exp_3_b7}}</a:t>
+              </a:r>
+            </a:p>
+            <a:p>
+              <a:pPr algn="l" marL="1017188" indent="-339063" lvl="2">
+                <a:lnSpc>
+                  <a:spcPts val="4233"/>
+                </a:lnSpc>
+                <a:buFont typeface="Arial"/>
+                <a:buChar char="⚬"/>
+              </a:pPr>
+              <a:r>
+                <a:rPr lang="en-US" sz="2263">
+                  <a:solidFill>
+                    <a:srgbClr val="000000"/>
+                  </a:solidFill>
+                  <a:latin typeface="Montserrat"/>
+                  <a:ea typeface="Montserrat"/>
+                  <a:cs typeface="Montserrat"/>
+                  <a:sym typeface="Montserrat"/>
+                </a:rPr>
+                <a:t>{{exp_3_b8}}</a:t>
+              </a:r>
+            </a:p>
+            <a:p>
+              <a:pPr algn="l" marL="1017188" indent="-339063" lvl="2">
+                <a:lnSpc>
+                  <a:spcPts val="4233"/>
+                </a:lnSpc>
+                <a:buFont typeface="Arial"/>
+                <a:buChar char="⚬"/>
+              </a:pPr>
+              <a:r>
+                <a:rPr lang="en-US" sz="2263">
+                  <a:solidFill>
+                    <a:srgbClr val="000000"/>
+                  </a:solidFill>
+                  <a:latin typeface="Montserrat"/>
+                  <a:ea typeface="Montserrat"/>
+                  <a:cs typeface="Montserrat"/>
+                  <a:sym typeface="Montserrat"/>
+                </a:rPr>
+                <a:t>{{exp_3_b9}}</a:t>
+              </a:r>
+            </a:p>
+            <a:p>
+              <a:pPr algn="l">
+                <a:lnSpc>
+                  <a:spcPts val="4233"/>
+                </a:lnSpc>
+              </a:pPr>
+            </a:p>
+          </p:txBody>
+        </p:sp>
+        <p:sp>
+          <p:nvSpPr>
+            <p:cNvPr name="TextBox 54" id="54"/>
+            <p:cNvSpPr txBox="true"/>
+            <p:nvPr/>
+          </p:nvSpPr>
+          <p:spPr>
+            <a:xfrm rot="0">
+              <a:off x="15747" y="3175"/>
+              <a:ext cx="3201194" cy="492234"/>
+            </a:xfrm>
+            <a:prstGeom prst="rect">
+              <a:avLst/>
+            </a:prstGeom>
+          </p:spPr>
+          <p:txBody>
+            <a:bodyPr anchor="t" rtlCol="false" tIns="0" lIns="0" bIns="0" rIns="0">
+              <a:spAutoFit/>
+            </a:bodyPr>
+            <a:lstStyle/>
+            <a:p>
+              <a:pPr algn="l">
+                <a:lnSpc>
+                  <a:spcPts val="3145"/>
+                </a:lnSpc>
+              </a:pPr>
+              <a:r>
+                <a:rPr lang="en-US" sz="2246" b="true">
+                  <a:solidFill>
+                    <a:srgbClr val="2B554E"/>
+                  </a:solidFill>
+                  <a:latin typeface="Montserrat Bold"/>
+                  <a:ea typeface="Montserrat Bold"/>
+                  <a:cs typeface="Montserrat Bold"/>
+                  <a:sym typeface="Montserrat Bold"/>
+                </a:rPr>
+                <a:t>{</a:t>
+              </a:r>
+              <a:r>
+                <a:rPr lang="en-US" sz="2246" b="true">
+                  <a:solidFill>
+                    <a:srgbClr val="2B554E"/>
+                  </a:solidFill>
+                  <a:latin typeface="Montserrat Bold"/>
+                  <a:ea typeface="Montserrat Bold"/>
+                  <a:cs typeface="Montserrat Bold"/>
+                  <a:sym typeface="Montserrat Bold"/>
+                </a:rPr>
+                <a:t>{exp_3_role}} </a:t>
+              </a:r>
+              <a:r>
+                <a:rPr lang="en-US" sz="2246">
+                  <a:solidFill>
+                    <a:srgbClr val="000000"/>
+                  </a:solidFill>
+                  <a:latin typeface="Montserrat"/>
+                  <a:ea typeface="Montserrat"/>
+                  <a:cs typeface="Montserrat"/>
+                  <a:sym typeface="Montserrat"/>
+                </a:rPr>
+                <a:t> </a:t>
+              </a:r>
+            </a:p>
+          </p:txBody>
+        </p:sp>
+        <p:sp>
+          <p:nvSpPr>
+            <p:cNvPr name="TextBox 55" id="55"/>
+            <p:cNvSpPr txBox="true"/>
+            <p:nvPr/>
+          </p:nvSpPr>
+          <p:spPr>
+            <a:xfrm rot="0">
+              <a:off x="6844455" y="-33834"/>
+              <a:ext cx="4101902" cy="492234"/>
+            </a:xfrm>
+            <a:prstGeom prst="rect">
+              <a:avLst/>
+            </a:prstGeom>
+          </p:spPr>
+          <p:txBody>
+            <a:bodyPr anchor="t" rtlCol="false" tIns="0" lIns="0" bIns="0" rIns="0">
+              <a:spAutoFit/>
+            </a:bodyPr>
+            <a:lstStyle/>
+            <a:p>
+              <a:pPr algn="l">
+                <a:lnSpc>
+                  <a:spcPts val="3145"/>
+                </a:lnSpc>
+              </a:pPr>
+              <a:r>
+                <a:rPr lang="en-US" sz="2246">
+                  <a:solidFill>
+                    <a:srgbClr val="000000"/>
+                  </a:solidFill>
+                  <a:latin typeface="Montserrat"/>
+                  <a:ea typeface="Montserrat"/>
+                  <a:cs typeface="Montserrat"/>
+                  <a:sym typeface="Montserrat"/>
+                </a:rPr>
+                <a:t>{{exp_3_company}}</a:t>
+              </a:r>
+            </a:p>
+          </p:txBody>
+        </p:sp>
+        <p:sp>
+          <p:nvSpPr>
+            <p:cNvPr name="TextBox 56" id="56"/>
+            <p:cNvSpPr txBox="true"/>
+            <p:nvPr/>
+          </p:nvSpPr>
+          <p:spPr>
+            <a:xfrm rot="0">
+              <a:off x="10975969" y="-9525"/>
+              <a:ext cx="3501781" cy="467925"/>
             </a:xfrm>
             <a:prstGeom prst="rect">
               <a:avLst/>
@@ -4097,34 +5941,371 @@
             <a:p>
               <a:pPr algn="ctr">
                 <a:lnSpc>
-                  <a:spcPts val="15102"/>
+                  <a:spcPts val="2784"/>
+                </a:lnSpc>
+                <a:spcBef>
+                  <a:spcPct val="0"/>
+                </a:spcBef>
+              </a:pPr>
+              <a:r>
+                <a:rPr lang="en-US" sz="2263">
+                  <a:solidFill>
+                    <a:srgbClr val="000000"/>
+                  </a:solidFill>
+                  <a:latin typeface="Montserrat"/>
+                  <a:ea typeface="Montserrat"/>
+                  <a:cs typeface="Montserrat"/>
+                  <a:sym typeface="Montserrat"/>
+                </a:rPr>
+                <a:t>– {{exp_3_dates}}</a:t>
+              </a:r>
+            </a:p>
+          </p:txBody>
+        </p:sp>
+      </p:grpSp>
+      <p:grpSp>
+        <p:nvGrpSpPr>
+          <p:cNvPr name="Group 57" id="57"/>
+          <p:cNvGrpSpPr/>
+          <p:nvPr/>
+        </p:nvGrpSpPr>
+        <p:grpSpPr>
+          <a:xfrm rot="0">
+            <a:off x="2138400" y="15906235"/>
+            <a:ext cx="10857833" cy="6320875"/>
+            <a:chOff x="0" y="0"/>
+            <a:chExt cx="14477111" cy="8427833"/>
+          </a:xfrm>
+        </p:grpSpPr>
+        <p:sp>
+          <p:nvSpPr>
+            <p:cNvPr name="TextBox 58" id="58"/>
+            <p:cNvSpPr txBox="true"/>
+            <p:nvPr/>
+          </p:nvSpPr>
+          <p:spPr>
+            <a:xfrm rot="0">
+              <a:off x="0" y="709070"/>
+              <a:ext cx="14477111" cy="7718763"/>
+            </a:xfrm>
+            <a:prstGeom prst="rect">
+              <a:avLst/>
+            </a:prstGeom>
+          </p:spPr>
+          <p:txBody>
+            <a:bodyPr anchor="t" rtlCol="false" tIns="0" lIns="0" bIns="0" rIns="0">
+              <a:spAutoFit/>
+            </a:bodyPr>
+            <a:lstStyle/>
+            <a:p>
+              <a:pPr algn="l">
+                <a:lnSpc>
+                  <a:spcPts val="4233"/>
+                </a:lnSpc>
+              </a:pPr>
+            </a:p>
+            <a:p>
+              <a:pPr algn="l" marL="1017188" indent="-339063" lvl="2">
+                <a:lnSpc>
+                  <a:spcPts val="4233"/>
+                </a:lnSpc>
+                <a:buFont typeface="Arial"/>
+                <a:buChar char="⚬"/>
+              </a:pPr>
+              <a:r>
+                <a:rPr lang="en-US" sz="2263">
+                  <a:solidFill>
+                    <a:srgbClr val="000000"/>
+                  </a:solidFill>
+                  <a:latin typeface="Montserrat"/>
+                  <a:ea typeface="Montserrat"/>
+                  <a:cs typeface="Montserrat"/>
+                  <a:sym typeface="Montserrat"/>
+                </a:rPr>
+                <a:t>{{exp_2_b1}}</a:t>
+              </a:r>
+            </a:p>
+            <a:p>
+              <a:pPr algn="l" marL="1017188" indent="-339063" lvl="2">
+                <a:lnSpc>
+                  <a:spcPts val="4233"/>
+                </a:lnSpc>
+                <a:buFont typeface="Arial"/>
+                <a:buChar char="⚬"/>
+              </a:pPr>
+              <a:r>
+                <a:rPr lang="en-US" sz="2263">
+                  <a:solidFill>
+                    <a:srgbClr val="000000"/>
+                  </a:solidFill>
+                  <a:latin typeface="Montserrat"/>
+                  <a:ea typeface="Montserrat"/>
+                  <a:cs typeface="Montserrat"/>
+                  <a:sym typeface="Montserrat"/>
+                </a:rPr>
+                <a:t>{{exp_2_b2}}</a:t>
+              </a:r>
+            </a:p>
+            <a:p>
+              <a:pPr algn="l" marL="1017188" indent="-339063" lvl="2">
+                <a:lnSpc>
+                  <a:spcPts val="4233"/>
+                </a:lnSpc>
+                <a:buFont typeface="Arial"/>
+                <a:buChar char="⚬"/>
+              </a:pPr>
+              <a:r>
+                <a:rPr lang="en-US" sz="2263">
+                  <a:solidFill>
+                    <a:srgbClr val="000000"/>
+                  </a:solidFill>
+                  <a:latin typeface="Montserrat"/>
+                  <a:ea typeface="Montserrat"/>
+                  <a:cs typeface="Montserrat"/>
+                  <a:sym typeface="Montserrat"/>
+                </a:rPr>
+                <a:t>{{exp_2_b3}}</a:t>
+              </a:r>
+            </a:p>
+            <a:p>
+              <a:pPr algn="l" marL="1017188" indent="-339063" lvl="2">
+                <a:lnSpc>
+                  <a:spcPts val="4233"/>
+                </a:lnSpc>
+                <a:buFont typeface="Arial"/>
+                <a:buChar char="⚬"/>
+              </a:pPr>
+              <a:r>
+                <a:rPr lang="en-US" sz="2263">
+                  <a:solidFill>
+                    <a:srgbClr val="000000"/>
+                  </a:solidFill>
+                  <a:latin typeface="Montserrat"/>
+                  <a:ea typeface="Montserrat"/>
+                  <a:cs typeface="Montserrat"/>
+                  <a:sym typeface="Montserrat"/>
+                </a:rPr>
+                <a:t>{{exp_2_b4}}</a:t>
+              </a:r>
+            </a:p>
+            <a:p>
+              <a:pPr algn="l" marL="1017188" indent="-339063" lvl="2">
+                <a:lnSpc>
+                  <a:spcPts val="4233"/>
+                </a:lnSpc>
+                <a:buFont typeface="Arial"/>
+                <a:buChar char="⚬"/>
+              </a:pPr>
+              <a:r>
+                <a:rPr lang="en-US" sz="2263">
+                  <a:solidFill>
+                    <a:srgbClr val="000000"/>
+                  </a:solidFill>
+                  <a:latin typeface="Montserrat"/>
+                  <a:ea typeface="Montserrat"/>
+                  <a:cs typeface="Montserrat"/>
+                  <a:sym typeface="Montserrat"/>
+                </a:rPr>
+                <a:t>{{exp_2_b5}}</a:t>
+              </a:r>
+            </a:p>
+            <a:p>
+              <a:pPr algn="l" marL="1017188" indent="-339063" lvl="2">
+                <a:lnSpc>
+                  <a:spcPts val="4233"/>
+                </a:lnSpc>
+                <a:buFont typeface="Arial"/>
+                <a:buChar char="⚬"/>
+              </a:pPr>
+              <a:r>
+                <a:rPr lang="en-US" sz="2263">
+                  <a:solidFill>
+                    <a:srgbClr val="000000"/>
+                  </a:solidFill>
+                  <a:latin typeface="Montserrat"/>
+                  <a:ea typeface="Montserrat"/>
+                  <a:cs typeface="Montserrat"/>
+                  <a:sym typeface="Montserrat"/>
+                </a:rPr>
+                <a:t>{{exp_2_b6}}</a:t>
+              </a:r>
+            </a:p>
+            <a:p>
+              <a:pPr algn="l" marL="1017188" indent="-339063" lvl="2">
+                <a:lnSpc>
+                  <a:spcPts val="4233"/>
+                </a:lnSpc>
+                <a:buFont typeface="Arial"/>
+                <a:buChar char="⚬"/>
+              </a:pPr>
+              <a:r>
+                <a:rPr lang="en-US" sz="2263">
+                  <a:solidFill>
+                    <a:srgbClr val="000000"/>
+                  </a:solidFill>
+                  <a:latin typeface="Montserrat"/>
+                  <a:ea typeface="Montserrat"/>
+                  <a:cs typeface="Montserrat"/>
+                  <a:sym typeface="Montserrat"/>
+                </a:rPr>
+                <a:t>{{exp_2_b7}}</a:t>
+              </a:r>
+            </a:p>
+            <a:p>
+              <a:pPr algn="l" marL="1017188" indent="-339063" lvl="2">
+                <a:lnSpc>
+                  <a:spcPts val="4233"/>
+                </a:lnSpc>
+                <a:buFont typeface="Arial"/>
+                <a:buChar char="⚬"/>
+              </a:pPr>
+              <a:r>
+                <a:rPr lang="en-US" sz="2263">
+                  <a:solidFill>
+                    <a:srgbClr val="000000"/>
+                  </a:solidFill>
+                  <a:latin typeface="Montserrat"/>
+                  <a:ea typeface="Montserrat"/>
+                  <a:cs typeface="Montserrat"/>
+                  <a:sym typeface="Montserrat"/>
+                </a:rPr>
+                <a:t>{{exp_2_b8}}</a:t>
+              </a:r>
+            </a:p>
+            <a:p>
+              <a:pPr algn="l" marL="1017188" indent="-339063" lvl="2">
+                <a:lnSpc>
+                  <a:spcPts val="4233"/>
+                </a:lnSpc>
+                <a:buFont typeface="Arial"/>
+                <a:buChar char="⚬"/>
+              </a:pPr>
+              <a:r>
+                <a:rPr lang="en-US" sz="2263">
+                  <a:solidFill>
+                    <a:srgbClr val="000000"/>
+                  </a:solidFill>
+                  <a:latin typeface="Montserrat"/>
+                  <a:ea typeface="Montserrat"/>
+                  <a:cs typeface="Montserrat"/>
+                  <a:sym typeface="Montserrat"/>
+                </a:rPr>
+                <a:t>{{exp_2_b9}}</a:t>
+              </a:r>
+            </a:p>
+            <a:p>
+              <a:pPr algn="l">
+                <a:lnSpc>
+                  <a:spcPts val="4233"/>
+                </a:lnSpc>
+              </a:pPr>
+            </a:p>
+          </p:txBody>
+        </p:sp>
+        <p:sp>
+          <p:nvSpPr>
+            <p:cNvPr name="TextBox 59" id="59"/>
+            <p:cNvSpPr txBox="true"/>
+            <p:nvPr/>
+          </p:nvSpPr>
+          <p:spPr>
+            <a:xfrm rot="0">
+              <a:off x="15747" y="49196"/>
+              <a:ext cx="6495029" cy="492234"/>
+            </a:xfrm>
+            <a:prstGeom prst="rect">
+              <a:avLst/>
+            </a:prstGeom>
+          </p:spPr>
+          <p:txBody>
+            <a:bodyPr anchor="t" rtlCol="false" tIns="0" lIns="0" bIns="0" rIns="0">
+              <a:spAutoFit/>
+            </a:bodyPr>
+            <a:lstStyle/>
+            <a:p>
+              <a:pPr algn="l">
+                <a:lnSpc>
+                  <a:spcPts val="3145"/>
                 </a:lnSpc>
               </a:pPr>
               <a:r>
-                <a:rPr lang="en-US" sz="8599">
+                <a:rPr lang="en-US" sz="2246" b="true">
                   <a:solidFill>
-                    <a:srgbClr val="000000"/>
+                    <a:srgbClr val="2B554E"/>
                   </a:solidFill>
-                  <a:latin typeface="Playfair Display"/>
-                  <a:ea typeface="Playfair Display"/>
-                  <a:cs typeface="Playfair Display"/>
-                  <a:sym typeface="Playfair Display"/>
+                  <a:latin typeface="Montserrat Bold"/>
+                  <a:ea typeface="Montserrat Bold"/>
+                  <a:cs typeface="Montserrat Bold"/>
+                  <a:sym typeface="Montserrat Bold"/>
                 </a:rPr>
-                <a:t>{{name}}</a:t>
+                <a:t>{</a:t>
+              </a:r>
+              <a:r>
+                <a:rPr lang="en-US" sz="2246" b="true">
+                  <a:solidFill>
+                    <a:srgbClr val="2B554E"/>
+                  </a:solidFill>
+                  <a:latin typeface="Montserrat Bold"/>
+                  <a:ea typeface="Montserrat Bold"/>
+                  <a:cs typeface="Montserrat Bold"/>
+                  <a:sym typeface="Montserrat Bold"/>
+                </a:rPr>
+                <a:t>{exp_2_role}} </a:t>
               </a:r>
             </a:p>
           </p:txBody>
         </p:sp>
         <p:sp>
           <p:nvSpPr>
-            <p:cNvPr name="TextBox 23" id="23"/>
+            <p:cNvPr name="TextBox 60" id="60"/>
             <p:cNvSpPr txBox="true"/>
             <p:nvPr/>
           </p:nvSpPr>
           <p:spPr>
             <a:xfrm rot="0">
-              <a:off x="1945062" y="2149003"/>
-              <a:ext cx="11368850" cy="1432695"/>
+              <a:off x="6764789" y="-16169"/>
+              <a:ext cx="4101902" cy="492234"/>
+            </a:xfrm>
+            <a:prstGeom prst="rect">
+              <a:avLst/>
+            </a:prstGeom>
+          </p:spPr>
+          <p:txBody>
+            <a:bodyPr anchor="t" rtlCol="false" tIns="0" lIns="0" bIns="0" rIns="0">
+              <a:spAutoFit/>
+            </a:bodyPr>
+            <a:lstStyle/>
+            <a:p>
+              <a:pPr algn="l">
+                <a:lnSpc>
+                  <a:spcPts val="3145"/>
+                </a:lnSpc>
+              </a:pPr>
+              <a:r>
+                <a:rPr lang="en-US" sz="2246">
+                  <a:solidFill>
+                    <a:srgbClr val="000000"/>
+                  </a:solidFill>
+                  <a:latin typeface="Montserrat"/>
+                  <a:ea typeface="Montserrat"/>
+                  <a:cs typeface="Montserrat"/>
+                  <a:sym typeface="Montserrat"/>
+                </a:rPr>
+                <a:t>{{exp_2_company}}</a:t>
+              </a:r>
+            </a:p>
+          </p:txBody>
+        </p:sp>
+        <p:sp>
+          <p:nvSpPr>
+            <p:cNvPr name="TextBox 61" id="61"/>
+            <p:cNvSpPr txBox="true"/>
+            <p:nvPr/>
+          </p:nvSpPr>
+          <p:spPr>
+            <a:xfrm rot="0">
+              <a:off x="11125808" y="-9525"/>
+              <a:ext cx="3170634" cy="467925"/>
             </a:xfrm>
             <a:prstGeom prst="rect">
               <a:avLst/>
@@ -4138,20 +6319,23 @@
             <a:p>
               <a:pPr algn="ctr">
                 <a:lnSpc>
-                  <a:spcPts val="9089"/>
+                  <a:spcPts val="2784"/>
                 </a:lnSpc>
+                <a:spcBef>
+                  <a:spcPct val="0"/>
+                </a:spcBef>
               </a:pPr>
               <a:r>
-                <a:rPr lang="en-US" sz="6500">
+                <a:rPr lang="en-US" sz="2263">
                   <a:solidFill>
                     <a:srgbClr val="000000"/>
                   </a:solidFill>
-                  <a:latin typeface="Playfair Display"/>
-                  <a:ea typeface="Playfair Display"/>
-                  <a:cs typeface="Playfair Display"/>
-                  <a:sym typeface="Playfair Display"/>
+                  <a:latin typeface="Montserrat"/>
+                  <a:ea typeface="Montserrat"/>
+                  <a:cs typeface="Montserrat"/>
+                  <a:sym typeface="Montserrat"/>
                 </a:rPr>
-                <a:t>{{title}}</a:t>
+                <a:t>– {{exp_2_dates}}</a:t>
               </a:r>
             </a:p>
           </p:txBody>
@@ -4159,14 +6343,14 @@
       </p:grpSp>
       <p:sp>
         <p:nvSpPr>
-          <p:cNvPr name="TextBox 24" id="24"/>
+          <p:cNvPr name="TextBox 62" id="62"/>
           <p:cNvSpPr txBox="true"/>
           <p:nvPr/>
         </p:nvSpPr>
         <p:spPr>
           <a:xfrm rot="0">
-            <a:off x="9368590" y="7961289"/>
-            <a:ext cx="11444230" cy="1147530"/>
+            <a:off x="15247458" y="562089"/>
+            <a:ext cx="5358832" cy="1251585"/>
           </a:xfrm>
           <a:prstGeom prst="rect">
             <a:avLst/>
@@ -4178,684 +6362,35 @@
           </a:bodyPr>
           <a:lstStyle/>
           <a:p>
-            <a:pPr algn="ctr">
+            <a:pPr algn="l">
               <a:lnSpc>
-                <a:spcPts val="9834"/>
+                <a:spcPts val="5040"/>
               </a:lnSpc>
             </a:pPr>
             <a:r>
-              <a:rPr lang="en-US" sz="5600">
+              <a:rPr lang="en-US" sz="3600">
                 <a:solidFill>
-                  <a:srgbClr val="000000"/>
+                  <a:srgbClr val="FFFFFF"/>
                 </a:solidFill>
-                <a:latin typeface="Playfair Display"/>
-                <a:ea typeface="Playfair Display"/>
-                <a:cs typeface="Playfair Display"/>
-                <a:sym typeface="Playfair Display"/>
+                <a:latin typeface="Montserrat"/>
+                <a:ea typeface="Montserrat"/>
+                <a:cs typeface="Montserrat"/>
+                <a:sym typeface="Montserrat"/>
               </a:rPr>
-              <a:t>EXPERIENCIA LABORAL</a:t>
-            </a:r>
-          </a:p>
-        </p:txBody>
-      </p:sp>
-      <p:sp>
-        <p:nvSpPr>
-          <p:cNvPr name="TextBox 25" id="25"/>
-          <p:cNvSpPr txBox="true"/>
-          <p:nvPr/>
-        </p:nvSpPr>
-        <p:spPr>
-          <a:xfrm rot="0">
-            <a:off x="10266696" y="9693581"/>
-            <a:ext cx="9319967" cy="638823"/>
-          </a:xfrm>
-          <a:prstGeom prst="rect">
-            <a:avLst/>
-          </a:prstGeom>
-        </p:spPr>
-        <p:txBody>
-          <a:bodyPr anchor="t" rtlCol="false" tIns="0" lIns="0" bIns="0" rIns="0">
-            <a:spAutoFit/>
-          </a:bodyPr>
-          <a:lstStyle/>
+              <a:t>{{%photo}}</a:t>
+            </a:r>
+          </a:p>
           <a:p>
             <a:pPr algn="l">
               <a:lnSpc>
-                <a:spcPts val="5077"/>
+                <a:spcPts val="5040"/>
               </a:lnSpc>
+              <a:spcBef>
+                <a:spcPct val="0"/>
+              </a:spcBef>
             </a:pPr>
-            <a:r>
-              <a:rPr lang="en-US" sz="3360">
-                <a:solidFill>
-                  <a:srgbClr val="202021"/>
-                </a:solidFill>
-                <a:latin typeface="Poppins"/>
-                <a:ea typeface="Poppins"/>
-                <a:cs typeface="Poppins"/>
-                <a:sym typeface="Poppins"/>
-              </a:rPr>
-              <a:t>{{</a:t>
-            </a:r>
-            <a:r>
-              <a:rPr lang="en-US" sz="3360">
-                <a:solidFill>
-                  <a:srgbClr val="202021"/>
-                </a:solidFill>
-                <a:latin typeface="Poppins"/>
-                <a:ea typeface="Poppins"/>
-                <a:cs typeface="Poppins"/>
-                <a:sym typeface="Poppins"/>
-              </a:rPr>
-              <a:t>exp_1_role}}</a:t>
-            </a:r>
-          </a:p>
-        </p:txBody>
-      </p:sp>
-      <p:sp>
-        <p:nvSpPr>
-          <p:cNvPr name="TextBox 26" id="26"/>
-          <p:cNvSpPr txBox="true"/>
-          <p:nvPr/>
-        </p:nvSpPr>
-        <p:spPr>
-          <a:xfrm rot="0">
-            <a:off x="10517308" y="11212871"/>
-            <a:ext cx="4409372" cy="1217391"/>
-          </a:xfrm>
-          <a:prstGeom prst="rect">
-            <a:avLst/>
-          </a:prstGeom>
-        </p:spPr>
-        <p:txBody>
-          <a:bodyPr anchor="t" rtlCol="false" tIns="0" lIns="0" bIns="0" rIns="0">
-            <a:spAutoFit/>
-          </a:bodyPr>
-          <a:lstStyle/>
-          <a:p>
-            <a:pPr algn="l">
-              <a:lnSpc>
-                <a:spcPts val="4825"/>
-              </a:lnSpc>
-            </a:pPr>
-            <a:r>
-              <a:rPr lang="en-US" sz="3197" i="true">
-                <a:solidFill>
-                  <a:srgbClr val="202021"/>
-                </a:solidFill>
-                <a:latin typeface="Poppins Italics"/>
-                <a:ea typeface="Poppins Italics"/>
-                <a:cs typeface="Poppins Italics"/>
-                <a:sym typeface="Poppins Italics"/>
-              </a:rPr>
-              <a:t>{{exp_1_c</a:t>
-            </a:r>
-            <a:r>
-              <a:rPr lang="en-US" sz="3197" i="true">
-                <a:solidFill>
-                  <a:srgbClr val="202021"/>
-                </a:solidFill>
-                <a:latin typeface="Poppins Italics"/>
-                <a:ea typeface="Poppins Italics"/>
-                <a:cs typeface="Poppins Italics"/>
-                <a:sym typeface="Poppins Italics"/>
-              </a:rPr>
-              <a:t>ompany}}</a:t>
-            </a:r>
-          </a:p>
-          <a:p>
-            <a:pPr algn="l">
-              <a:lnSpc>
-                <a:spcPts val="4827"/>
-              </a:lnSpc>
-            </a:pPr>
-          </a:p>
-        </p:txBody>
-      </p:sp>
-      <p:sp>
-        <p:nvSpPr>
-          <p:cNvPr name="TextBox 27" id="27"/>
-          <p:cNvSpPr txBox="true"/>
-          <p:nvPr/>
-        </p:nvSpPr>
-        <p:spPr>
-          <a:xfrm rot="0">
-            <a:off x="9961873" y="12156135"/>
-            <a:ext cx="11422127" cy="1811339"/>
-          </a:xfrm>
-          <a:prstGeom prst="rect">
-            <a:avLst/>
-          </a:prstGeom>
-        </p:spPr>
-        <p:txBody>
-          <a:bodyPr anchor="t" rtlCol="false" tIns="0" lIns="0" bIns="0" rIns="0">
-            <a:spAutoFit/>
-          </a:bodyPr>
-          <a:lstStyle/>
-          <a:p>
-            <a:pPr algn="l" marL="1442410" indent="-480803" lvl="2">
-              <a:lnSpc>
-                <a:spcPts val="4599"/>
-              </a:lnSpc>
-              <a:buFont typeface="Arial"/>
-              <a:buChar char="⚬"/>
-            </a:pPr>
-            <a:r>
-              <a:rPr lang="en-US" sz="3593">
-                <a:solidFill>
-                  <a:srgbClr val="000000"/>
-                </a:solidFill>
-                <a:latin typeface="Calibri (MS)"/>
-                <a:ea typeface="Calibri (MS)"/>
-                <a:cs typeface="Calibri (MS)"/>
-                <a:sym typeface="Calibri (MS)"/>
-              </a:rPr>
-              <a:t>{{exp_1_b1}}</a:t>
-            </a:r>
-          </a:p>
-          <a:p>
-            <a:pPr algn="l" marL="1442410" indent="-480803" lvl="2">
-              <a:lnSpc>
-                <a:spcPts val="4599"/>
-              </a:lnSpc>
-              <a:buFont typeface="Arial"/>
-              <a:buChar char="⚬"/>
-            </a:pPr>
-            <a:r>
-              <a:rPr lang="en-US" sz="3593">
-                <a:solidFill>
-                  <a:srgbClr val="000000"/>
-                </a:solidFill>
-                <a:latin typeface="Calibri (MS)"/>
-                <a:ea typeface="Calibri (MS)"/>
-                <a:cs typeface="Calibri (MS)"/>
-                <a:sym typeface="Calibri (MS)"/>
-              </a:rPr>
-              <a:t>{{exp_1_b2}}</a:t>
-            </a:r>
-          </a:p>
-          <a:p>
-            <a:pPr algn="l" marL="1442185" indent="-480728" lvl="2">
-              <a:lnSpc>
-                <a:spcPts val="4599"/>
-              </a:lnSpc>
-              <a:buFont typeface="Arial"/>
-              <a:buChar char="⚬"/>
-            </a:pPr>
-            <a:r>
-              <a:rPr lang="en-US" sz="3593">
-                <a:solidFill>
-                  <a:srgbClr val="000000"/>
-                </a:solidFill>
-                <a:latin typeface="Calibri (MS)"/>
-                <a:ea typeface="Calibri (MS)"/>
-                <a:cs typeface="Calibri (MS)"/>
-                <a:sym typeface="Calibri (MS)"/>
-              </a:rPr>
-              <a:t>{{exp_1_b3}}</a:t>
-            </a:r>
-          </a:p>
-        </p:txBody>
-      </p:sp>
-      <p:sp>
-        <p:nvSpPr>
-          <p:cNvPr name="TextBox 28" id="28"/>
-          <p:cNvSpPr txBox="true"/>
-          <p:nvPr/>
-        </p:nvSpPr>
-        <p:spPr>
-          <a:xfrm rot="0">
-            <a:off x="14531737" y="10146343"/>
-            <a:ext cx="6602361" cy="381866"/>
-          </a:xfrm>
-          <a:prstGeom prst="rect">
-            <a:avLst/>
-          </a:prstGeom>
-        </p:spPr>
-        <p:txBody>
-          <a:bodyPr anchor="t" rtlCol="false" tIns="0" lIns="0" bIns="0" rIns="0">
-            <a:spAutoFit/>
-          </a:bodyPr>
-          <a:lstStyle/>
-          <a:p>
-            <a:pPr algn="r">
-              <a:lnSpc>
-                <a:spcPts val="2297"/>
-              </a:lnSpc>
-            </a:pPr>
-            <a:r>
-              <a:rPr lang="en-US" sz="2953">
-                <a:solidFill>
-                  <a:srgbClr val="000000"/>
-                </a:solidFill>
-                <a:latin typeface="Calibri (MS)"/>
-                <a:ea typeface="Calibri (MS)"/>
-                <a:cs typeface="Calibri (MS)"/>
-                <a:sym typeface="Calibri (MS)"/>
-              </a:rPr>
-              <a:t>{{exp_1_dates}}</a:t>
-            </a:r>
-          </a:p>
-        </p:txBody>
-      </p:sp>
-      <p:sp>
-        <p:nvSpPr>
-          <p:cNvPr name="TextBox 29" id="29"/>
-          <p:cNvSpPr txBox="true"/>
-          <p:nvPr/>
-        </p:nvSpPr>
-        <p:spPr>
-          <a:xfrm rot="0">
-            <a:off x="10299757" y="16696625"/>
-            <a:ext cx="9603228" cy="638823"/>
-          </a:xfrm>
-          <a:prstGeom prst="rect">
-            <a:avLst/>
-          </a:prstGeom>
-        </p:spPr>
-        <p:txBody>
-          <a:bodyPr anchor="t" rtlCol="false" tIns="0" lIns="0" bIns="0" rIns="0">
-            <a:spAutoFit/>
-          </a:bodyPr>
-          <a:lstStyle/>
-          <a:p>
-            <a:pPr algn="l">
-              <a:lnSpc>
-                <a:spcPts val="5077"/>
-              </a:lnSpc>
-            </a:pPr>
-            <a:r>
-              <a:rPr lang="en-US" sz="3360">
-                <a:solidFill>
-                  <a:srgbClr val="202021"/>
-                </a:solidFill>
-                <a:latin typeface="Poppins"/>
-                <a:ea typeface="Poppins"/>
-                <a:cs typeface="Poppins"/>
-                <a:sym typeface="Poppins"/>
-              </a:rPr>
-              <a:t>{{</a:t>
-            </a:r>
-            <a:r>
-              <a:rPr lang="en-US" sz="3360">
-                <a:solidFill>
-                  <a:srgbClr val="202021"/>
-                </a:solidFill>
-                <a:latin typeface="Poppins"/>
-                <a:ea typeface="Poppins"/>
-                <a:cs typeface="Poppins"/>
-                <a:sym typeface="Poppins"/>
-              </a:rPr>
-              <a:t>exp_2_role}}</a:t>
-            </a:r>
-          </a:p>
-        </p:txBody>
-      </p:sp>
-      <p:sp>
-        <p:nvSpPr>
-          <p:cNvPr name="TextBox 30" id="30"/>
-          <p:cNvSpPr txBox="true"/>
-          <p:nvPr/>
-        </p:nvSpPr>
-        <p:spPr>
-          <a:xfrm rot="0">
-            <a:off x="10517308" y="18380866"/>
-            <a:ext cx="4409372" cy="607642"/>
-          </a:xfrm>
-          <a:prstGeom prst="rect">
-            <a:avLst/>
-          </a:prstGeom>
-        </p:spPr>
-        <p:txBody>
-          <a:bodyPr anchor="t" rtlCol="false" tIns="0" lIns="0" bIns="0" rIns="0">
-            <a:spAutoFit/>
-          </a:bodyPr>
-          <a:lstStyle/>
-          <a:p>
-            <a:pPr algn="l">
-              <a:lnSpc>
-                <a:spcPts val="4827"/>
-              </a:lnSpc>
-            </a:pPr>
-            <a:r>
-              <a:rPr lang="en-US" sz="3197" i="true">
-                <a:solidFill>
-                  <a:srgbClr val="202021"/>
-                </a:solidFill>
-                <a:latin typeface="Poppins Italics"/>
-                <a:ea typeface="Poppins Italics"/>
-                <a:cs typeface="Poppins Italics"/>
-                <a:sym typeface="Poppins Italics"/>
-              </a:rPr>
-              <a:t>{{exp_2_c</a:t>
-            </a:r>
-            <a:r>
-              <a:rPr lang="en-US" sz="3197" i="true">
-                <a:solidFill>
-                  <a:srgbClr val="202021"/>
-                </a:solidFill>
-                <a:latin typeface="Poppins Italics"/>
-                <a:ea typeface="Poppins Italics"/>
-                <a:cs typeface="Poppins Italics"/>
-                <a:sym typeface="Poppins Italics"/>
-              </a:rPr>
-              <a:t>ompany}}</a:t>
-            </a:r>
-          </a:p>
-        </p:txBody>
-      </p:sp>
-      <p:sp>
-        <p:nvSpPr>
-          <p:cNvPr name="TextBox 31" id="31"/>
-          <p:cNvSpPr txBox="true"/>
-          <p:nvPr/>
-        </p:nvSpPr>
-        <p:spPr>
-          <a:xfrm rot="0">
-            <a:off x="10064760" y="19371370"/>
-            <a:ext cx="8933955" cy="1811339"/>
-          </a:xfrm>
-          <a:prstGeom prst="rect">
-            <a:avLst/>
-          </a:prstGeom>
-        </p:spPr>
-        <p:txBody>
-          <a:bodyPr anchor="t" rtlCol="false" tIns="0" lIns="0" bIns="0" rIns="0">
-            <a:spAutoFit/>
-          </a:bodyPr>
-          <a:lstStyle/>
-          <a:p>
-            <a:pPr algn="l" marL="1442410" indent="-480803" lvl="2">
-              <a:lnSpc>
-                <a:spcPts val="4599"/>
-              </a:lnSpc>
-              <a:buFont typeface="Arial"/>
-              <a:buChar char="⚬"/>
-            </a:pPr>
-            <a:r>
-              <a:rPr lang="en-US" sz="3593">
-                <a:solidFill>
-                  <a:srgbClr val="000000"/>
-                </a:solidFill>
-                <a:latin typeface="Calibri (MS)"/>
-                <a:ea typeface="Calibri (MS)"/>
-                <a:cs typeface="Calibri (MS)"/>
-                <a:sym typeface="Calibri (MS)"/>
-              </a:rPr>
-              <a:t>{{exp_2_b1}}</a:t>
-            </a:r>
-          </a:p>
-          <a:p>
-            <a:pPr algn="l" marL="1442410" indent="-480803" lvl="2">
-              <a:lnSpc>
-                <a:spcPts val="4599"/>
-              </a:lnSpc>
-              <a:buFont typeface="Arial"/>
-              <a:buChar char="⚬"/>
-            </a:pPr>
-            <a:r>
-              <a:rPr lang="en-US" sz="3593">
-                <a:solidFill>
-                  <a:srgbClr val="000000"/>
-                </a:solidFill>
-                <a:latin typeface="Calibri (MS)"/>
-                <a:ea typeface="Calibri (MS)"/>
-                <a:cs typeface="Calibri (MS)"/>
-                <a:sym typeface="Calibri (MS)"/>
-              </a:rPr>
-              <a:t>{{exp_2_b2}}</a:t>
-            </a:r>
-          </a:p>
-          <a:p>
-            <a:pPr algn="l" marL="1442185" indent="-480728" lvl="2">
-              <a:lnSpc>
-                <a:spcPts val="4599"/>
-              </a:lnSpc>
-              <a:buFont typeface="Arial"/>
-              <a:buChar char="⚬"/>
-            </a:pPr>
-            <a:r>
-              <a:rPr lang="en-US" sz="3593">
-                <a:solidFill>
-                  <a:srgbClr val="000000"/>
-                </a:solidFill>
-                <a:latin typeface="Calibri (MS)"/>
-                <a:ea typeface="Calibri (MS)"/>
-                <a:cs typeface="Calibri (MS)"/>
-                <a:sym typeface="Calibri (MS)"/>
-              </a:rPr>
-              <a:t>{{exp_2_b3}}</a:t>
-            </a:r>
-          </a:p>
-        </p:txBody>
-      </p:sp>
-      <p:sp>
-        <p:nvSpPr>
-          <p:cNvPr name="TextBox 32" id="32"/>
-          <p:cNvSpPr txBox="true"/>
-          <p:nvPr/>
-        </p:nvSpPr>
-        <p:spPr>
-          <a:xfrm rot="0">
-            <a:off x="15090705" y="17159165"/>
-            <a:ext cx="6073807" cy="377260"/>
-          </a:xfrm>
-          <a:prstGeom prst="rect">
-            <a:avLst/>
-          </a:prstGeom>
-        </p:spPr>
-        <p:txBody>
-          <a:bodyPr anchor="t" rtlCol="false" tIns="0" lIns="0" bIns="0" rIns="0">
-            <a:spAutoFit/>
-          </a:bodyPr>
-          <a:lstStyle/>
-          <a:p>
-            <a:pPr algn="r">
-              <a:lnSpc>
-                <a:spcPts val="2294"/>
-              </a:lnSpc>
-            </a:pPr>
-            <a:r>
-              <a:rPr lang="en-US" sz="2949">
-                <a:solidFill>
-                  <a:srgbClr val="000000"/>
-                </a:solidFill>
-                <a:latin typeface="Calibri (MS)"/>
-                <a:ea typeface="Calibri (MS)"/>
-                <a:cs typeface="Calibri (MS)"/>
-                <a:sym typeface="Calibri (MS)"/>
-              </a:rPr>
-              <a:t>{{exp_2_dates}}</a:t>
-            </a:r>
-          </a:p>
-        </p:txBody>
-      </p:sp>
-      <p:sp>
-        <p:nvSpPr>
-          <p:cNvPr name="TextBox 33" id="33"/>
-          <p:cNvSpPr txBox="true"/>
-          <p:nvPr/>
-        </p:nvSpPr>
-        <p:spPr>
-          <a:xfrm rot="0">
-            <a:off x="4944406" y="24896881"/>
-            <a:ext cx="4848806" cy="580976"/>
-          </a:xfrm>
-          <a:prstGeom prst="rect">
-            <a:avLst/>
-          </a:prstGeom>
-        </p:spPr>
-        <p:txBody>
-          <a:bodyPr anchor="t" rtlCol="false" tIns="0" lIns="0" bIns="0" rIns="0">
-            <a:spAutoFit/>
-          </a:bodyPr>
-          <a:lstStyle/>
-          <a:p>
-            <a:pPr algn="r">
-              <a:lnSpc>
-                <a:spcPts val="4305"/>
-              </a:lnSpc>
-            </a:pPr>
-            <a:r>
-              <a:rPr lang="en-US" sz="2900">
-                <a:solidFill>
-                  <a:srgbClr val="000000"/>
-                </a:solidFill>
-                <a:latin typeface="Calibri (MS)"/>
-                <a:ea typeface="Calibri (MS)"/>
-                <a:cs typeface="Calibri (MS)"/>
-                <a:sym typeface="Calibri (MS)"/>
-              </a:rPr>
-              <a:t>{{edu_1_years}}</a:t>
-            </a:r>
-          </a:p>
-        </p:txBody>
-      </p:sp>
-      <p:sp>
-        <p:nvSpPr>
-          <p:cNvPr name="TextBox 34" id="34"/>
-          <p:cNvSpPr txBox="true"/>
-          <p:nvPr/>
-        </p:nvSpPr>
-        <p:spPr>
-          <a:xfrm rot="0">
-            <a:off x="915727" y="28002205"/>
-            <a:ext cx="6965375" cy="536991"/>
-          </a:xfrm>
-          <a:prstGeom prst="rect">
-            <a:avLst/>
-          </a:prstGeom>
-        </p:spPr>
-        <p:txBody>
-          <a:bodyPr anchor="t" rtlCol="false" tIns="0" lIns="0" bIns="0" rIns="0">
-            <a:spAutoFit/>
-          </a:bodyPr>
-          <a:lstStyle/>
-          <a:p>
-            <a:pPr algn="l">
-              <a:lnSpc>
-                <a:spcPts val="4249"/>
-              </a:lnSpc>
-            </a:pPr>
-            <a:r>
-              <a:rPr lang="en-US" sz="2814" i="true">
-                <a:solidFill>
-                  <a:srgbClr val="202021"/>
-                </a:solidFill>
-                <a:latin typeface="Poppins Italics"/>
-                <a:ea typeface="Poppins Italics"/>
-                <a:cs typeface="Poppins Italics"/>
-                <a:sym typeface="Poppins Italics"/>
-              </a:rPr>
-              <a:t>{{ed</a:t>
-            </a:r>
-            <a:r>
-              <a:rPr lang="en-US" sz="2814" i="true">
-                <a:solidFill>
-                  <a:srgbClr val="202021"/>
-                </a:solidFill>
-                <a:latin typeface="Poppins Italics"/>
-                <a:ea typeface="Poppins Italics"/>
-                <a:cs typeface="Poppins Italics"/>
-                <a:sym typeface="Poppins Italics"/>
-              </a:rPr>
-              <a:t>u_2_degree}}</a:t>
-            </a:r>
-          </a:p>
-        </p:txBody>
-      </p:sp>
-      <p:sp>
-        <p:nvSpPr>
-          <p:cNvPr name="TextBox 35" id="35"/>
-          <p:cNvSpPr txBox="true"/>
-          <p:nvPr/>
-        </p:nvSpPr>
-        <p:spPr>
-          <a:xfrm rot="0">
-            <a:off x="5033768" y="26963823"/>
-            <a:ext cx="4759444" cy="580976"/>
-          </a:xfrm>
-          <a:prstGeom prst="rect">
-            <a:avLst/>
-          </a:prstGeom>
-        </p:spPr>
-        <p:txBody>
-          <a:bodyPr anchor="t" rtlCol="false" tIns="0" lIns="0" bIns="0" rIns="0">
-            <a:spAutoFit/>
-          </a:bodyPr>
-          <a:lstStyle/>
-          <a:p>
-            <a:pPr algn="r">
-              <a:lnSpc>
-                <a:spcPts val="4305"/>
-              </a:lnSpc>
-            </a:pPr>
-            <a:r>
-              <a:rPr lang="en-US" sz="2900">
-                <a:solidFill>
-                  <a:srgbClr val="000000"/>
-                </a:solidFill>
-                <a:latin typeface="Calibri (MS)"/>
-                <a:ea typeface="Calibri (MS)"/>
-                <a:cs typeface="Calibri (MS)"/>
-                <a:sym typeface="Calibri (MS)"/>
-              </a:rPr>
-              <a:t>{{edu_2_years}}</a:t>
-            </a:r>
-          </a:p>
-        </p:txBody>
-      </p:sp>
-      <p:sp>
-        <p:nvSpPr>
-          <p:cNvPr name="Freeform 36" id="36"/>
-          <p:cNvSpPr/>
-          <p:nvPr/>
-        </p:nvSpPr>
-        <p:spPr>
-          <a:xfrm flipH="false" flipV="false" rot="0">
-            <a:off x="18311995" y="1043220"/>
-            <a:ext cx="1373440" cy="1180348"/>
-          </a:xfrm>
-          <a:custGeom>
-            <a:avLst/>
-            <a:gdLst/>
-            <a:ahLst/>
-            <a:cxnLst/>
-            <a:rect r="r" b="b" t="t" l="l"/>
-            <a:pathLst>
-              <a:path h="1180348" w="1373440">
-                <a:moveTo>
-                  <a:pt x="0" y="0"/>
-                </a:moveTo>
-                <a:lnTo>
-                  <a:pt x="1373440" y="0"/>
-                </a:lnTo>
-                <a:lnTo>
-                  <a:pt x="1373440" y="1180348"/>
-                </a:lnTo>
-                <a:lnTo>
-                  <a:pt x="0" y="1180348"/>
-                </a:lnTo>
-                <a:lnTo>
-                  <a:pt x="0" y="0"/>
-                </a:lnTo>
-                <a:close/>
-              </a:path>
-            </a:pathLst>
-          </a:custGeom>
-          <a:blipFill>
-            <a:blip r:embed="rId15">
-              <a:alphaModFix amt="37000"/>
-              <a:extLst>
-                <a:ext uri="{96DAC541-7B7A-43D3-8B79-37D633B846F1}">
-                  <asvg:svgBlip xmlns:asvg="http://schemas.microsoft.com/office/drawing/2016/SVG/main" r:embed="rId16"/>
-                </a:ext>
-              </a:extLst>
-            </a:blip>
-            <a:stretch>
-              <a:fillRect l="-69612" t="-214629" r="-10004" b="0"/>
-            </a:stretch>
-          </a:blipFill>
-        </p:spPr>
+          </a:p>
+        </p:txBody>
       </p:sp>
     </p:spTree>
   </p:cSld>

</xml_diff>